<commit_message>
added frozen lake example
</commit_message>
<xml_diff>
--- a/week_7/Module 5 - Dynamic Programming, Policy Evaluation.pptx
+++ b/week_7/Module 5 - Dynamic Programming, Policy Evaluation.pptx
@@ -6,7 +6,7 @@
     <p:sldMasterId id="2147483660" r:id="rId13"/>
   </p:sldMasterIdLst>
   <p:notesMasterIdLst>
-    <p:notesMasterId r:id="rId49"/>
+    <p:notesMasterId r:id="rId48"/>
   </p:notesMasterIdLst>
   <p:sldIdLst>
     <p:sldId id="256" r:id="rId14"/>
@@ -41,9 +41,8 @@
     <p:sldId id="378" r:id="rId43"/>
     <p:sldId id="381" r:id="rId44"/>
     <p:sldId id="380" r:id="rId45"/>
-    <p:sldId id="379" r:id="rId46"/>
-    <p:sldId id="356" r:id="rId47"/>
-    <p:sldId id="305" r:id="rId48"/>
+    <p:sldId id="356" r:id="rId46"/>
+    <p:sldId id="305" r:id="rId47"/>
   </p:sldIdLst>
   <p:sldSz cx="12192000" cy="6858000"/>
   <p:notesSz cx="6858000" cy="9144000"/>
@@ -1331,18 +1330,18 @@
     </pc:docChg>
   </pc:docChgLst>
   <pc:docChgLst>
-    <pc:chgData name="Joseph Marvin R. Imperial" userId="c5118018-74d5-4421-be4d-7197191e5b08" providerId="ADAL" clId="{AB9EEC7B-5938-AB4A-BBF1-2D08914B856E}"/>
-    <pc:docChg chg="addSld delSld">
-      <pc:chgData name="Joseph Marvin R. Imperial" userId="c5118018-74d5-4421-be4d-7197191e5b08" providerId="ADAL" clId="{AB9EEC7B-5938-AB4A-BBF1-2D08914B856E}" dt="2021-04-20T00:57:02.237" v="3" actId="2696"/>
+    <pc:chgData name="Joseph Marvin R. Imperial" userId="c5118018-74d5-4421-be4d-7197191e5b08" providerId="ADAL" clId="{8B587F43-1B51-4416-B410-57F8B9E236B1}"/>
+    <pc:docChg chg="undo custSel addSld delSld modSld">
+      <pc:chgData name="Joseph Marvin R. Imperial" userId="c5118018-74d5-4421-be4d-7197191e5b08" providerId="ADAL" clId="{8B587F43-1B51-4416-B410-57F8B9E236B1}" dt="2021-03-24T12:30:06.351" v="559" actId="5793"/>
       <pc:docMkLst>
         <pc:docMk/>
       </pc:docMkLst>
     </pc:docChg>
   </pc:docChgLst>
   <pc:docChgLst>
-    <pc:chgData name="Joseph Marvin R. Imperial" userId="c5118018-74d5-4421-be4d-7197191e5b08" providerId="ADAL" clId="{8B587F43-1B51-4416-B410-57F8B9E236B1}"/>
-    <pc:docChg chg="undo custSel addSld delSld modSld">
-      <pc:chgData name="Joseph Marvin R. Imperial" userId="c5118018-74d5-4421-be4d-7197191e5b08" providerId="ADAL" clId="{8B587F43-1B51-4416-B410-57F8B9E236B1}" dt="2021-03-24T12:30:06.351" v="559" actId="5793"/>
+    <pc:chgData name="Joseph Marvin R. Imperial" userId="c5118018-74d5-4421-be4d-7197191e5b08" providerId="ADAL" clId="{AB9EEC7B-5938-AB4A-BBF1-2D08914B856E}"/>
+    <pc:docChg chg="addSld delSld">
+      <pc:chgData name="Joseph Marvin R. Imperial" userId="c5118018-74d5-4421-be4d-7197191e5b08" providerId="ADAL" clId="{AB9EEC7B-5938-AB4A-BBF1-2D08914B856E}" dt="2021-04-20T00:57:02.237" v="3" actId="2696"/>
       <pc:docMkLst>
         <pc:docMk/>
       </pc:docMkLst>
@@ -1911,7 +1910,7 @@
           <a:p>
             <a:fld id="{DCEEA480-FAED-44A7-B0CF-D7F3DF7642EB}" type="datetimeFigureOut">
               <a:rPr lang="en-PH" smtClean="0"/>
-              <a:t>10/05/2023</a:t>
+              <a:t>12/05/2023</a:t>
             </a:fld>
             <a:endParaRPr lang="en-PH"/>
           </a:p>
@@ -2383,126 +2382,6 @@
 </p:notes>
 </file>
 
-<file path=ppt/notesSlides/notesSlide11.xml><?xml version="1.0" encoding="utf-8"?>
-<p:notes xmlns:a="http://schemas.openxmlformats.org/drawingml/2006/main" xmlns:r="http://schemas.openxmlformats.org/officeDocument/2006/relationships" xmlns:p="http://schemas.openxmlformats.org/presentationml/2006/main">
-  <p:cSld>
-    <p:spTree>
-      <p:nvGrpSpPr>
-        <p:cNvPr id="1" name=""/>
-        <p:cNvGrpSpPr/>
-        <p:nvPr/>
-      </p:nvGrpSpPr>
-      <p:grpSpPr>
-        <a:xfrm>
-          <a:off x="0" y="0"/>
-          <a:ext cx="0" cy="0"/>
-          <a:chOff x="0" y="0"/>
-          <a:chExt cx="0" cy="0"/>
-        </a:xfrm>
-      </p:grpSpPr>
-      <p:sp>
-        <p:nvSpPr>
-          <p:cNvPr id="2" name="Slide Image Placeholder 1"/>
-          <p:cNvSpPr>
-            <a:spLocks noGrp="1" noRot="1" noChangeAspect="1"/>
-          </p:cNvSpPr>
-          <p:nvPr>
-            <p:ph type="sldImg"/>
-          </p:nvPr>
-        </p:nvSpPr>
-        <p:spPr/>
-      </p:sp>
-      <p:sp>
-        <p:nvSpPr>
-          <p:cNvPr id="3" name="Notes Placeholder 2"/>
-          <p:cNvSpPr>
-            <a:spLocks noGrp="1"/>
-          </p:cNvSpPr>
-          <p:nvPr>
-            <p:ph type="body" idx="1"/>
-          </p:nvPr>
-        </p:nvSpPr>
-        <p:spPr/>
-        <p:txBody>
-          <a:bodyPr/>
-          <a:lstStyle/>
-          <a:p>
-            <a:r>
-              <a:rPr lang="en-PH" dirty="0"/>
-              <a:t>Acting greedily means pick actions in a way that gives us a maximum action value (q).</a:t>
-            </a:r>
-          </a:p>
-          <a:p>
-            <a:r>
-              <a:rPr lang="en-PH" dirty="0"/>
-              <a:t>Action value (q) is the immediate reward plus the value function where you end up.</a:t>
-            </a:r>
-          </a:p>
-          <a:p>
-            <a:endParaRPr lang="en-PH" dirty="0"/>
-          </a:p>
-          <a:p>
-            <a:r>
-              <a:rPr lang="en-PH" dirty="0"/>
-              <a:t>Follow new greedy policy from one step then follow policy from then onwards starting in s.</a:t>
-            </a:r>
-          </a:p>
-          <a:p>
-            <a:endParaRPr lang="en-PH" dirty="0"/>
-          </a:p>
-          <a:p>
-            <a:r>
-              <a:rPr lang="en-PH" dirty="0"/>
-              <a:t>Following a greedy policy for one step is better than following the old policy</a:t>
-            </a:r>
-          </a:p>
-          <a:p>
-            <a:endParaRPr lang="en-PH" dirty="0"/>
-          </a:p>
-          <a:p>
-            <a:r>
-              <a:rPr lang="en-PH" dirty="0"/>
-              <a:t>Then iterate the same process for two, three, four, five steps.</a:t>
-            </a:r>
-          </a:p>
-        </p:txBody>
-      </p:sp>
-      <p:sp>
-        <p:nvSpPr>
-          <p:cNvPr id="4" name="Slide Number Placeholder 3"/>
-          <p:cNvSpPr>
-            <a:spLocks noGrp="1"/>
-          </p:cNvSpPr>
-          <p:nvPr>
-            <p:ph type="sldNum" sz="quarter" idx="5"/>
-          </p:nvPr>
-        </p:nvSpPr>
-        <p:spPr/>
-        <p:txBody>
-          <a:bodyPr/>
-          <a:lstStyle/>
-          <a:p>
-            <a:fld id="{465F1461-96C2-4222-BBBB-83024B2ACE35}" type="slidenum">
-              <a:rPr lang="en-PH" smtClean="0"/>
-              <a:t>33</a:t>
-            </a:fld>
-            <a:endParaRPr lang="en-PH"/>
-          </a:p>
-        </p:txBody>
-      </p:sp>
-    </p:spTree>
-    <p:extLst>
-      <p:ext uri="{BB962C8B-B14F-4D97-AF65-F5344CB8AC3E}">
-        <p14:creationId xmlns:p14="http://schemas.microsoft.com/office/powerpoint/2010/main" val="1200152198"/>
-      </p:ext>
-    </p:extLst>
-  </p:cSld>
-  <p:clrMapOvr>
-    <a:masterClrMapping/>
-  </p:clrMapOvr>
-</p:notes>
-</file>
-
 <file path=ppt/notesSlides/notesSlide2.xml><?xml version="1.0" encoding="utf-8"?>
 <p:notes xmlns:a="http://schemas.openxmlformats.org/drawingml/2006/main" xmlns:r="http://schemas.openxmlformats.org/officeDocument/2006/relationships" xmlns:p="http://schemas.openxmlformats.org/presentationml/2006/main">
   <p:cSld>
@@ -3507,7 +3386,7 @@
           <a:p>
             <a:fld id="{E3F2C046-3488-4271-867B-6B64A28EF1DF}" type="datetimeFigureOut">
               <a:rPr lang="en-PH" smtClean="0"/>
-              <a:t>10/05/2023</a:t>
+              <a:t>12/05/2023</a:t>
             </a:fld>
             <a:endParaRPr lang="en-PH"/>
           </a:p>
@@ -3707,7 +3586,7 @@
           <a:p>
             <a:fld id="{E3F2C046-3488-4271-867B-6B64A28EF1DF}" type="datetimeFigureOut">
               <a:rPr lang="en-PH" smtClean="0"/>
-              <a:t>10/05/2023</a:t>
+              <a:t>12/05/2023</a:t>
             </a:fld>
             <a:endParaRPr lang="en-PH"/>
           </a:p>
@@ -3917,7 +3796,7 @@
           <a:p>
             <a:fld id="{E3F2C046-3488-4271-867B-6B64A28EF1DF}" type="datetimeFigureOut">
               <a:rPr lang="en-PH" smtClean="0"/>
-              <a:t>10/05/2023</a:t>
+              <a:t>12/05/2023</a:t>
             </a:fld>
             <a:endParaRPr lang="en-PH"/>
           </a:p>
@@ -4177,7 +4056,7 @@
           <a:p>
             <a:fld id="{E3F2C046-3488-4271-867B-6B64A28EF1DF}" type="datetimeFigureOut">
               <a:rPr lang="en-PH" smtClean="0"/>
-              <a:t>10/05/2023</a:t>
+              <a:t>12/05/2023</a:t>
             </a:fld>
             <a:endParaRPr lang="en-PH"/>
           </a:p>
@@ -4453,7 +4332,7 @@
           <a:p>
             <a:fld id="{E3F2C046-3488-4271-867B-6B64A28EF1DF}" type="datetimeFigureOut">
               <a:rPr lang="en-PH" smtClean="0"/>
-              <a:t>10/05/2023</a:t>
+              <a:t>12/05/2023</a:t>
             </a:fld>
             <a:endParaRPr lang="en-PH"/>
           </a:p>
@@ -4721,7 +4600,7 @@
           <a:p>
             <a:fld id="{E3F2C046-3488-4271-867B-6B64A28EF1DF}" type="datetimeFigureOut">
               <a:rPr lang="en-PH" smtClean="0"/>
-              <a:t>10/05/2023</a:t>
+              <a:t>12/05/2023</a:t>
             </a:fld>
             <a:endParaRPr lang="en-PH"/>
           </a:p>
@@ -5136,7 +5015,7 @@
           <a:p>
             <a:fld id="{E3F2C046-3488-4271-867B-6B64A28EF1DF}" type="datetimeFigureOut">
               <a:rPr lang="en-PH" smtClean="0"/>
-              <a:t>10/05/2023</a:t>
+              <a:t>12/05/2023</a:t>
             </a:fld>
             <a:endParaRPr lang="en-PH"/>
           </a:p>
@@ -5278,7 +5157,7 @@
           <a:p>
             <a:fld id="{E3F2C046-3488-4271-867B-6B64A28EF1DF}" type="datetimeFigureOut">
               <a:rPr lang="en-PH" smtClean="0"/>
-              <a:t>10/05/2023</a:t>
+              <a:t>12/05/2023</a:t>
             </a:fld>
             <a:endParaRPr lang="en-PH"/>
           </a:p>
@@ -5391,7 +5270,7 @@
           <a:p>
             <a:fld id="{E3F2C046-3488-4271-867B-6B64A28EF1DF}" type="datetimeFigureOut">
               <a:rPr lang="en-PH" smtClean="0"/>
-              <a:t>10/05/2023</a:t>
+              <a:t>12/05/2023</a:t>
             </a:fld>
             <a:endParaRPr lang="en-PH"/>
           </a:p>
@@ -5704,7 +5583,7 @@
           <a:p>
             <a:fld id="{E3F2C046-3488-4271-867B-6B64A28EF1DF}" type="datetimeFigureOut">
               <a:rPr lang="en-PH" smtClean="0"/>
-              <a:t>10/05/2023</a:t>
+              <a:t>12/05/2023</a:t>
             </a:fld>
             <a:endParaRPr lang="en-PH"/>
           </a:p>
@@ -5993,7 +5872,7 @@
           <a:p>
             <a:fld id="{E3F2C046-3488-4271-867B-6B64A28EF1DF}" type="datetimeFigureOut">
               <a:rPr lang="en-PH" smtClean="0"/>
-              <a:t>10/05/2023</a:t>
+              <a:t>12/05/2023</a:t>
             </a:fld>
             <a:endParaRPr lang="en-PH"/>
           </a:p>
@@ -6236,7 +6115,7 @@
           <a:p>
             <a:fld id="{E3F2C046-3488-4271-867B-6B64A28EF1DF}" type="datetimeFigureOut">
               <a:rPr lang="en-PH" smtClean="0"/>
-              <a:t>10/05/2023</a:t>
+              <a:t>12/05/2023</a:t>
             </a:fld>
             <a:endParaRPr lang="en-PH"/>
           </a:p>
@@ -11182,8 +11061,8 @@
           </a:p>
         </p:txBody>
       </p:sp>
-      <mc:AlternateContent xmlns:mc="http://schemas.openxmlformats.org/markup-compatibility/2006">
-        <mc:Choice xmlns:a14="http://schemas.microsoft.com/office/drawing/2010/main" Requires="a14">
+      <mc:AlternateContent xmlns:mc="http://schemas.openxmlformats.org/markup-compatibility/2006" xmlns:a14="http://schemas.microsoft.com/office/drawing/2010/main">
+        <mc:Choice Requires="a14">
           <p:sp>
             <p:nvSpPr>
               <p:cNvPr id="10" name="Content Placeholder 9">
@@ -11462,7 +11341,7 @@
             </p:txBody>
           </p:sp>
         </mc:Choice>
-        <mc:Fallback>
+        <mc:Fallback xmlns="">
           <p:sp>
             <p:nvSpPr>
               <p:cNvPr id="10" name="Content Placeholder 9">
@@ -14186,8 +14065,8 @@
           </a:graphicData>
         </a:graphic>
       </p:graphicFrame>
-      <mc:AlternateContent xmlns:mc="http://schemas.openxmlformats.org/markup-compatibility/2006">
-        <mc:Choice xmlns:a14="http://schemas.microsoft.com/office/drawing/2010/main" Requires="a14">
+      <mc:AlternateContent xmlns:mc="http://schemas.openxmlformats.org/markup-compatibility/2006" xmlns:a14="http://schemas.microsoft.com/office/drawing/2010/main">
+        <mc:Choice Requires="a14">
           <p:sp>
             <p:nvSpPr>
               <p:cNvPr id="22" name="TextBox 21">
@@ -14259,7 +14138,7 @@
             </p:txBody>
           </p:sp>
         </mc:Choice>
-        <mc:Fallback>
+        <mc:Fallback xmlns="">
           <p:sp>
             <p:nvSpPr>
               <p:cNvPr id="22" name="TextBox 21">
@@ -14304,8 +14183,8 @@
           </p:sp>
         </mc:Fallback>
       </mc:AlternateContent>
-      <mc:AlternateContent xmlns:mc="http://schemas.openxmlformats.org/markup-compatibility/2006">
-        <mc:Choice xmlns:a14="http://schemas.microsoft.com/office/drawing/2010/main" Requires="a14">
+      <mc:AlternateContent xmlns:mc="http://schemas.openxmlformats.org/markup-compatibility/2006" xmlns:a14="http://schemas.microsoft.com/office/drawing/2010/main">
+        <mc:Choice Requires="a14">
           <p:sp>
             <p:nvSpPr>
               <p:cNvPr id="25" name="TextBox 24">
@@ -14377,7 +14256,7 @@
             </p:txBody>
           </p:sp>
         </mc:Choice>
-        <mc:Fallback>
+        <mc:Fallback xmlns="">
           <p:sp>
             <p:nvSpPr>
               <p:cNvPr id="25" name="TextBox 24">
@@ -14680,8 +14559,8 @@
           </a:p>
         </p:txBody>
       </p:sp>
-      <mc:AlternateContent xmlns:mc="http://schemas.openxmlformats.org/markup-compatibility/2006">
-        <mc:Choice xmlns:a14="http://schemas.microsoft.com/office/drawing/2010/main" Requires="a14">
+      <mc:AlternateContent xmlns:mc="http://schemas.openxmlformats.org/markup-compatibility/2006" xmlns:a14="http://schemas.microsoft.com/office/drawing/2010/main">
+        <mc:Choice Requires="a14">
           <p:sp>
             <p:nvSpPr>
               <p:cNvPr id="2" name="TextBox 1">
@@ -14753,7 +14632,7 @@
             </p:txBody>
           </p:sp>
         </mc:Choice>
-        <mc:Fallback>
+        <mc:Fallback xmlns="">
           <p:sp>
             <p:nvSpPr>
               <p:cNvPr id="2" name="TextBox 1">
@@ -14798,8 +14677,8 @@
           </p:sp>
         </mc:Fallback>
       </mc:AlternateContent>
-      <mc:AlternateContent xmlns:mc="http://schemas.openxmlformats.org/markup-compatibility/2006">
-        <mc:Choice xmlns:a14="http://schemas.microsoft.com/office/drawing/2010/main" Requires="a14">
+      <mc:AlternateContent xmlns:mc="http://schemas.openxmlformats.org/markup-compatibility/2006" xmlns:a14="http://schemas.microsoft.com/office/drawing/2010/main">
+        <mc:Choice Requires="a14">
           <p:sp>
             <p:nvSpPr>
               <p:cNvPr id="3" name="TextBox 2">
@@ -14871,7 +14750,7 @@
             </p:txBody>
           </p:sp>
         </mc:Choice>
-        <mc:Fallback>
+        <mc:Fallback xmlns="">
           <p:sp>
             <p:nvSpPr>
               <p:cNvPr id="3" name="TextBox 2">
@@ -14916,8 +14795,8 @@
           </p:sp>
         </mc:Fallback>
       </mc:AlternateContent>
-      <mc:AlternateContent xmlns:mc="http://schemas.openxmlformats.org/markup-compatibility/2006">
-        <mc:Choice xmlns:a14="http://schemas.microsoft.com/office/drawing/2010/main" Requires="a14">
+      <mc:AlternateContent xmlns:mc="http://schemas.openxmlformats.org/markup-compatibility/2006" xmlns:a14="http://schemas.microsoft.com/office/drawing/2010/main">
+        <mc:Choice Requires="a14">
           <p:sp>
             <p:nvSpPr>
               <p:cNvPr id="4" name="TextBox 3">
@@ -14989,7 +14868,7 @@
             </p:txBody>
           </p:sp>
         </mc:Choice>
-        <mc:Fallback>
+        <mc:Fallback xmlns="">
           <p:sp>
             <p:nvSpPr>
               <p:cNvPr id="4" name="TextBox 3">
@@ -15034,8 +14913,8 @@
           </p:sp>
         </mc:Fallback>
       </mc:AlternateContent>
-      <mc:AlternateContent xmlns:mc="http://schemas.openxmlformats.org/markup-compatibility/2006">
-        <mc:Choice xmlns:a14="http://schemas.microsoft.com/office/drawing/2010/main" Requires="a14">
+      <mc:AlternateContent xmlns:mc="http://schemas.openxmlformats.org/markup-compatibility/2006" xmlns:a14="http://schemas.microsoft.com/office/drawing/2010/main">
+        <mc:Choice Requires="a14">
           <p:sp>
             <p:nvSpPr>
               <p:cNvPr id="6" name="TextBox 5">
@@ -15064,6 +14943,7 @@
               </a:bodyPr>
               <a:lstStyle/>
               <a:p>
+                <a:pPr/>
                 <a14:m>
                   <m:oMathPara xmlns:m="http://schemas.openxmlformats.org/officeDocument/2006/math">
                     <m:oMathParaPr>
@@ -15134,7 +15014,7 @@
             </p:txBody>
           </p:sp>
         </mc:Choice>
-        <mc:Fallback>
+        <mc:Fallback xmlns="">
           <p:sp>
             <p:nvSpPr>
               <p:cNvPr id="6" name="TextBox 5">
@@ -16247,8 +16127,8 @@
           </a:graphicData>
         </a:graphic>
       </p:graphicFrame>
-      <mc:AlternateContent xmlns:mc="http://schemas.openxmlformats.org/markup-compatibility/2006">
-        <mc:Choice xmlns:a14="http://schemas.microsoft.com/office/drawing/2010/main" Requires="a14">
+      <mc:AlternateContent xmlns:mc="http://schemas.openxmlformats.org/markup-compatibility/2006" xmlns:a14="http://schemas.microsoft.com/office/drawing/2010/main">
+        <mc:Choice Requires="a14">
           <p:sp>
             <p:nvSpPr>
               <p:cNvPr id="22" name="TextBox 21">
@@ -16320,7 +16200,7 @@
             </p:txBody>
           </p:sp>
         </mc:Choice>
-        <mc:Fallback>
+        <mc:Fallback xmlns="">
           <p:sp>
             <p:nvSpPr>
               <p:cNvPr id="22" name="TextBox 21">
@@ -16365,8 +16245,8 @@
           </p:sp>
         </mc:Fallback>
       </mc:AlternateContent>
-      <mc:AlternateContent xmlns:mc="http://schemas.openxmlformats.org/markup-compatibility/2006">
-        <mc:Choice xmlns:a14="http://schemas.microsoft.com/office/drawing/2010/main" Requires="a14">
+      <mc:AlternateContent xmlns:mc="http://schemas.openxmlformats.org/markup-compatibility/2006" xmlns:a14="http://schemas.microsoft.com/office/drawing/2010/main">
+        <mc:Choice Requires="a14">
           <p:sp>
             <p:nvSpPr>
               <p:cNvPr id="25" name="TextBox 24">
@@ -16438,7 +16318,7 @@
             </p:txBody>
           </p:sp>
         </mc:Choice>
-        <mc:Fallback>
+        <mc:Fallback xmlns="">
           <p:sp>
             <p:nvSpPr>
               <p:cNvPr id="25" name="TextBox 24">
@@ -16741,8 +16621,8 @@
           </a:p>
         </p:txBody>
       </p:sp>
-      <mc:AlternateContent xmlns:mc="http://schemas.openxmlformats.org/markup-compatibility/2006">
-        <mc:Choice xmlns:a14="http://schemas.microsoft.com/office/drawing/2010/main" Requires="a14">
+      <mc:AlternateContent xmlns:mc="http://schemas.openxmlformats.org/markup-compatibility/2006" xmlns:a14="http://schemas.microsoft.com/office/drawing/2010/main">
+        <mc:Choice Requires="a14">
           <p:sp>
             <p:nvSpPr>
               <p:cNvPr id="2" name="TextBox 1">
@@ -16814,7 +16694,7 @@
             </p:txBody>
           </p:sp>
         </mc:Choice>
-        <mc:Fallback>
+        <mc:Fallback xmlns="">
           <p:sp>
             <p:nvSpPr>
               <p:cNvPr id="2" name="TextBox 1">
@@ -16859,8 +16739,8 @@
           </p:sp>
         </mc:Fallback>
       </mc:AlternateContent>
-      <mc:AlternateContent xmlns:mc="http://schemas.openxmlformats.org/markup-compatibility/2006">
-        <mc:Choice xmlns:a14="http://schemas.microsoft.com/office/drawing/2010/main" Requires="a14">
+      <mc:AlternateContent xmlns:mc="http://schemas.openxmlformats.org/markup-compatibility/2006" xmlns:a14="http://schemas.microsoft.com/office/drawing/2010/main">
+        <mc:Choice Requires="a14">
           <p:sp>
             <p:nvSpPr>
               <p:cNvPr id="3" name="TextBox 2">
@@ -16932,7 +16812,7 @@
             </p:txBody>
           </p:sp>
         </mc:Choice>
-        <mc:Fallback>
+        <mc:Fallback xmlns="">
           <p:sp>
             <p:nvSpPr>
               <p:cNvPr id="3" name="TextBox 2">
@@ -16977,8 +16857,8 @@
           </p:sp>
         </mc:Fallback>
       </mc:AlternateContent>
-      <mc:AlternateContent xmlns:mc="http://schemas.openxmlformats.org/markup-compatibility/2006">
-        <mc:Choice xmlns:a14="http://schemas.microsoft.com/office/drawing/2010/main" Requires="a14">
+      <mc:AlternateContent xmlns:mc="http://schemas.openxmlformats.org/markup-compatibility/2006" xmlns:a14="http://schemas.microsoft.com/office/drawing/2010/main">
+        <mc:Choice Requires="a14">
           <p:sp>
             <p:nvSpPr>
               <p:cNvPr id="4" name="TextBox 3">
@@ -17050,7 +16930,7 @@
             </p:txBody>
           </p:sp>
         </mc:Choice>
-        <mc:Fallback>
+        <mc:Fallback xmlns="">
           <p:sp>
             <p:nvSpPr>
               <p:cNvPr id="4" name="TextBox 3">
@@ -17095,8 +16975,8 @@
           </p:sp>
         </mc:Fallback>
       </mc:AlternateContent>
-      <mc:AlternateContent xmlns:mc="http://schemas.openxmlformats.org/markup-compatibility/2006">
-        <mc:Choice xmlns:a14="http://schemas.microsoft.com/office/drawing/2010/main" Requires="a14">
+      <mc:AlternateContent xmlns:mc="http://schemas.openxmlformats.org/markup-compatibility/2006" xmlns:a14="http://schemas.microsoft.com/office/drawing/2010/main">
+        <mc:Choice Requires="a14">
           <p:sp>
             <p:nvSpPr>
               <p:cNvPr id="6" name="TextBox 5">
@@ -17196,7 +17076,7 @@
             </p:txBody>
           </p:sp>
         </mc:Choice>
-        <mc:Fallback>
+        <mc:Fallback xmlns="">
           <p:sp>
             <p:nvSpPr>
               <p:cNvPr id="6" name="TextBox 5">
@@ -25457,421 +25337,6 @@
               <a:rPr lang="en-PH" b="1" dirty="0">
                 <a:latin typeface="+mn-lt"/>
               </a:rPr>
-              <a:t>Value Iteration</a:t>
-            </a:r>
-          </a:p>
-        </p:txBody>
-      </p:sp>
-      <p:sp>
-        <p:nvSpPr>
-          <p:cNvPr id="4" name="TextBox 3">
-            <a:extLst>
-              <a:ext uri="{FF2B5EF4-FFF2-40B4-BE49-F238E27FC236}">
-                <a16:creationId xmlns:a16="http://schemas.microsoft.com/office/drawing/2014/main" id="{FAC6D868-76B5-FBB5-7055-EEA8A3151B7F}"/>
-              </a:ext>
-            </a:extLst>
-          </p:cNvPr>
-          <p:cNvSpPr txBox="1"/>
-          <p:nvPr/>
-        </p:nvSpPr>
-        <p:spPr>
-          <a:xfrm>
-            <a:off x="616772" y="2908854"/>
-            <a:ext cx="10958455" cy="707886"/>
-          </a:xfrm>
-          <a:prstGeom prst="rect">
-            <a:avLst/>
-          </a:prstGeom>
-          <a:noFill/>
-        </p:spPr>
-        <p:txBody>
-          <a:bodyPr wrap="square">
-            <a:spAutoFit/>
-          </a:bodyPr>
-          <a:lstStyle/>
-          <a:p>
-            <a:r>
-              <a:rPr lang="en-PH" sz="4000" dirty="0"/>
-              <a:t>https://www.cs.ubc.ca/~poole/demos/mdp/vi.html</a:t>
-            </a:r>
-          </a:p>
-        </p:txBody>
-      </p:sp>
-    </p:spTree>
-    <p:extLst>
-      <p:ext uri="{BB962C8B-B14F-4D97-AF65-F5344CB8AC3E}">
-        <p14:creationId xmlns:p14="http://schemas.microsoft.com/office/powerpoint/2010/main" val="3533477137"/>
-      </p:ext>
-    </p:extLst>
-  </p:cSld>
-  <p:clrMapOvr>
-    <a:masterClrMapping/>
-  </p:clrMapOvr>
-</p:sld>
-</file>
-
-<file path=ppt/slides/slide34.xml><?xml version="1.0" encoding="utf-8"?>
-<p:sld xmlns:a="http://schemas.openxmlformats.org/drawingml/2006/main" xmlns:r="http://schemas.openxmlformats.org/officeDocument/2006/relationships" xmlns:p="http://schemas.openxmlformats.org/presentationml/2006/main">
-  <p:cSld>
-    <p:spTree>
-      <p:nvGrpSpPr>
-        <p:cNvPr id="1" name=""/>
-        <p:cNvGrpSpPr/>
-        <p:nvPr/>
-      </p:nvGrpSpPr>
-      <p:grpSpPr>
-        <a:xfrm>
-          <a:off x="0" y="0"/>
-          <a:ext cx="0" cy="0"/>
-          <a:chOff x="0" y="0"/>
-          <a:chExt cx="0" cy="0"/>
-        </a:xfrm>
-      </p:grpSpPr>
-      <p:sp>
-        <p:nvSpPr>
-          <p:cNvPr id="6" name="TextBox 5">
-            <a:extLst>
-              <a:ext uri="{FF2B5EF4-FFF2-40B4-BE49-F238E27FC236}">
-                <a16:creationId xmlns:a16="http://schemas.microsoft.com/office/drawing/2014/main" id="{933CA7EB-D821-4578-A186-D330E9178EDE}"/>
-              </a:ext>
-            </a:extLst>
-          </p:cNvPr>
-          <p:cNvSpPr txBox="1"/>
-          <p:nvPr/>
-        </p:nvSpPr>
-        <p:spPr>
-          <a:xfrm>
-            <a:off x="87923" y="28551"/>
-            <a:ext cx="3622432" cy="338554"/>
-          </a:xfrm>
-          <a:prstGeom prst="rect">
-            <a:avLst/>
-          </a:prstGeom>
-          <a:noFill/>
-        </p:spPr>
-        <p:txBody>
-          <a:bodyPr wrap="square" rtlCol="0">
-            <a:spAutoFit/>
-          </a:bodyPr>
-          <a:lstStyle/>
-          <a:p>
-            <a:r>
-              <a:rPr lang="en-PH" sz="1600">
-                <a:solidFill>
-                  <a:schemeClr val="bg1"/>
-                </a:solidFill>
-                <a:latin typeface="Abadi" panose="020B0604020104020204" pitchFamily="34" charset="0"/>
-                <a:cs typeface="Aharoni" panose="020B0604020202020204" pitchFamily="2" charset="-79"/>
-              </a:rPr>
-              <a:t>INTRODUCTION TO COMPUTING</a:t>
-            </a:r>
-          </a:p>
-        </p:txBody>
-      </p:sp>
-      <p:sp>
-        <p:nvSpPr>
-          <p:cNvPr id="7" name="TextBox 6">
-            <a:extLst>
-              <a:ext uri="{FF2B5EF4-FFF2-40B4-BE49-F238E27FC236}">
-                <a16:creationId xmlns:a16="http://schemas.microsoft.com/office/drawing/2014/main" id="{9B128FD4-EE77-4086-837E-5EAF83B0DDD1}"/>
-              </a:ext>
-            </a:extLst>
-          </p:cNvPr>
-          <p:cNvSpPr txBox="1"/>
-          <p:nvPr/>
-        </p:nvSpPr>
-        <p:spPr>
-          <a:xfrm>
-            <a:off x="9182099" y="13190"/>
-            <a:ext cx="2948354" cy="338554"/>
-          </a:xfrm>
-          <a:prstGeom prst="rect">
-            <a:avLst/>
-          </a:prstGeom>
-          <a:noFill/>
-        </p:spPr>
-        <p:txBody>
-          <a:bodyPr wrap="square" rtlCol="0">
-            <a:spAutoFit/>
-          </a:bodyPr>
-          <a:lstStyle/>
-          <a:p>
-            <a:pPr algn="r"/>
-            <a:r>
-              <a:rPr lang="en-US" sz="1600" dirty="0">
-                <a:solidFill>
-                  <a:schemeClr val="bg1"/>
-                </a:solidFill>
-              </a:rPr>
-              <a:t>Course Code: CCINCOM/L</a:t>
-            </a:r>
-            <a:endParaRPr lang="en-PH" sz="1600" dirty="0">
-              <a:solidFill>
-                <a:schemeClr val="bg1"/>
-              </a:solidFill>
-              <a:latin typeface="Abadi" panose="020B0604020202020204" pitchFamily="34" charset="0"/>
-            </a:endParaRPr>
-          </a:p>
-        </p:txBody>
-      </p:sp>
-      <p:sp>
-        <p:nvSpPr>
-          <p:cNvPr id="8" name="TextBox 7">
-            <a:extLst>
-              <a:ext uri="{FF2B5EF4-FFF2-40B4-BE49-F238E27FC236}">
-                <a16:creationId xmlns:a16="http://schemas.microsoft.com/office/drawing/2014/main" id="{B95C7AD6-4918-4294-AA88-B72FB28833FE}"/>
-              </a:ext>
-            </a:extLst>
-          </p:cNvPr>
-          <p:cNvSpPr txBox="1"/>
-          <p:nvPr/>
-        </p:nvSpPr>
-        <p:spPr>
-          <a:xfrm>
-            <a:off x="0" y="6479929"/>
-            <a:ext cx="2461846" cy="338554"/>
-          </a:xfrm>
-          <a:prstGeom prst="rect">
-            <a:avLst/>
-          </a:prstGeom>
-          <a:noFill/>
-        </p:spPr>
-        <p:txBody>
-          <a:bodyPr wrap="square" rtlCol="0">
-            <a:spAutoFit/>
-          </a:bodyPr>
-          <a:lstStyle/>
-          <a:p>
-            <a:pPr algn="ctr"/>
-            <a:r>
-              <a:rPr lang="en-PH" sz="1600">
-                <a:solidFill>
-                  <a:schemeClr val="bg1"/>
-                </a:solidFill>
-                <a:latin typeface="Abadi" panose="020B0604020202020204" pitchFamily="34" charset="0"/>
-              </a:rPr>
-              <a:t>Joseph Marvin R. Imperial</a:t>
-            </a:r>
-          </a:p>
-        </p:txBody>
-      </p:sp>
-      <p:sp>
-        <p:nvSpPr>
-          <p:cNvPr id="9" name="TextBox 8">
-            <a:extLst>
-              <a:ext uri="{FF2B5EF4-FFF2-40B4-BE49-F238E27FC236}">
-                <a16:creationId xmlns:a16="http://schemas.microsoft.com/office/drawing/2014/main" id="{C3136E3D-4CFD-4EFC-98AB-367D0EF3C06B}"/>
-              </a:ext>
-            </a:extLst>
-          </p:cNvPr>
-          <p:cNvSpPr txBox="1"/>
-          <p:nvPr/>
-        </p:nvSpPr>
-        <p:spPr>
-          <a:xfrm>
-            <a:off x="7086601" y="6490896"/>
-            <a:ext cx="5105399" cy="338554"/>
-          </a:xfrm>
-          <a:prstGeom prst="rect">
-            <a:avLst/>
-          </a:prstGeom>
-          <a:noFill/>
-        </p:spPr>
-        <p:txBody>
-          <a:bodyPr wrap="square" rtlCol="0">
-            <a:spAutoFit/>
-          </a:bodyPr>
-          <a:lstStyle/>
-          <a:p>
-            <a:pPr algn="r"/>
-            <a:r>
-              <a:rPr lang="en-PH" sz="1600">
-                <a:solidFill>
-                  <a:schemeClr val="bg1"/>
-                </a:solidFill>
-                <a:latin typeface="Abadi" panose="020B0604020202020204" pitchFamily="34" charset="0"/>
-              </a:rPr>
-              <a:t>NU College of Computing and Information Technologies</a:t>
-            </a:r>
-          </a:p>
-        </p:txBody>
-      </p:sp>
-      <p:sp>
-        <p:nvSpPr>
-          <p:cNvPr id="13" name="Rectangle 12">
-            <a:extLst>
-              <a:ext uri="{FF2B5EF4-FFF2-40B4-BE49-F238E27FC236}">
-                <a16:creationId xmlns:a16="http://schemas.microsoft.com/office/drawing/2014/main" id="{251B30DC-ACC5-404F-B51D-13612F115E3E}"/>
-              </a:ext>
-            </a:extLst>
-          </p:cNvPr>
-          <p:cNvSpPr/>
-          <p:nvPr/>
-        </p:nvSpPr>
-        <p:spPr>
-          <a:xfrm>
-            <a:off x="0" y="6462346"/>
-            <a:ext cx="12192000" cy="395654"/>
-          </a:xfrm>
-          <a:prstGeom prst="rect">
-            <a:avLst/>
-          </a:prstGeom>
-          <a:solidFill>
-            <a:schemeClr val="accent5">
-              <a:lumMod val="50000"/>
-            </a:schemeClr>
-          </a:solidFill>
-          <a:effectLst>
-            <a:outerShdw blurRad="50800" dist="38100" dir="2700000" algn="tl" rotWithShape="0">
-              <a:prstClr val="black">
-                <a:alpha val="40000"/>
-              </a:prstClr>
-            </a:outerShdw>
-          </a:effectLst>
-        </p:spPr>
-        <p:style>
-          <a:lnRef idx="2">
-            <a:schemeClr val="accent1">
-              <a:shade val="50000"/>
-            </a:schemeClr>
-          </a:lnRef>
-          <a:fillRef idx="1">
-            <a:schemeClr val="accent1"/>
-          </a:fillRef>
-          <a:effectRef idx="0">
-            <a:schemeClr val="accent1"/>
-          </a:effectRef>
-          <a:fontRef idx="minor">
-            <a:schemeClr val="lt1"/>
-          </a:fontRef>
-        </p:style>
-        <p:txBody>
-          <a:bodyPr rtlCol="0" anchor="ctr"/>
-          <a:lstStyle/>
-          <a:p>
-            <a:pPr algn="ctr"/>
-            <a:endParaRPr lang="en-PH"/>
-          </a:p>
-        </p:txBody>
-      </p:sp>
-      <p:sp>
-        <p:nvSpPr>
-          <p:cNvPr id="14" name="TextBox 13">
-            <a:extLst>
-              <a:ext uri="{FF2B5EF4-FFF2-40B4-BE49-F238E27FC236}">
-                <a16:creationId xmlns:a16="http://schemas.microsoft.com/office/drawing/2014/main" id="{ACC57CA2-30CA-4DDD-A941-8B9CC393DAFA}"/>
-              </a:ext>
-            </a:extLst>
-          </p:cNvPr>
-          <p:cNvSpPr txBox="1"/>
-          <p:nvPr/>
-        </p:nvSpPr>
-        <p:spPr>
-          <a:xfrm>
-            <a:off x="0" y="6490896"/>
-            <a:ext cx="3622432" cy="338554"/>
-          </a:xfrm>
-          <a:prstGeom prst="rect">
-            <a:avLst/>
-          </a:prstGeom>
-          <a:noFill/>
-        </p:spPr>
-        <p:txBody>
-          <a:bodyPr wrap="square" rtlCol="0">
-            <a:spAutoFit/>
-          </a:bodyPr>
-          <a:lstStyle/>
-          <a:p>
-            <a:r>
-              <a:rPr lang="en-PH" sz="1600">
-                <a:solidFill>
-                  <a:schemeClr val="bg1"/>
-                </a:solidFill>
-                <a:latin typeface="Abadi" panose="020B0604020104020204" pitchFamily="34" charset="0"/>
-                <a:cs typeface="Aharoni" panose="020B0604020202020204" pitchFamily="2" charset="-79"/>
-              </a:rPr>
-              <a:t>REINFORCEMENT LEARNING</a:t>
-            </a:r>
-          </a:p>
-        </p:txBody>
-      </p:sp>
-      <p:sp>
-        <p:nvSpPr>
-          <p:cNvPr id="15" name="TextBox 14">
-            <a:extLst>
-              <a:ext uri="{FF2B5EF4-FFF2-40B4-BE49-F238E27FC236}">
-                <a16:creationId xmlns:a16="http://schemas.microsoft.com/office/drawing/2014/main" id="{31237222-F604-49F1-8989-AF06AF20EDD3}"/>
-              </a:ext>
-            </a:extLst>
-          </p:cNvPr>
-          <p:cNvSpPr txBox="1"/>
-          <p:nvPr/>
-        </p:nvSpPr>
-        <p:spPr>
-          <a:xfrm>
-            <a:off x="9243646" y="6490896"/>
-            <a:ext cx="2948354" cy="338554"/>
-          </a:xfrm>
-          <a:prstGeom prst="rect">
-            <a:avLst/>
-          </a:prstGeom>
-          <a:noFill/>
-        </p:spPr>
-        <p:txBody>
-          <a:bodyPr wrap="square" rtlCol="0">
-            <a:spAutoFit/>
-          </a:bodyPr>
-          <a:lstStyle/>
-          <a:p>
-            <a:pPr algn="r"/>
-            <a:r>
-              <a:rPr lang="en-US" sz="1600">
-                <a:solidFill>
-                  <a:schemeClr val="bg1"/>
-                </a:solidFill>
-                <a:latin typeface="Abadi" panose="020B0604020104020204" pitchFamily="34" charset="0"/>
-              </a:rPr>
-              <a:t>Course Code: CCRNFLRL</a:t>
-            </a:r>
-            <a:endParaRPr lang="en-PH" sz="1600">
-              <a:solidFill>
-                <a:schemeClr val="bg1"/>
-              </a:solidFill>
-              <a:latin typeface="Abadi" panose="020B0604020104020204" pitchFamily="34" charset="0"/>
-            </a:endParaRPr>
-          </a:p>
-        </p:txBody>
-      </p:sp>
-      <p:sp>
-        <p:nvSpPr>
-          <p:cNvPr id="5" name="Title 4">
-            <a:extLst>
-              <a:ext uri="{FF2B5EF4-FFF2-40B4-BE49-F238E27FC236}">
-                <a16:creationId xmlns:a16="http://schemas.microsoft.com/office/drawing/2014/main" id="{EC47D021-EEC4-42AC-B4C3-BC584CB5BC9D}"/>
-              </a:ext>
-            </a:extLst>
-          </p:cNvPr>
-          <p:cNvSpPr>
-            <a:spLocks noGrp="1"/>
-          </p:cNvSpPr>
-          <p:nvPr>
-            <p:ph type="title"/>
-          </p:nvPr>
-        </p:nvSpPr>
-        <p:spPr>
-          <a:xfrm>
-            <a:off x="352425" y="292273"/>
-            <a:ext cx="11458574" cy="869778"/>
-          </a:xfrm>
-        </p:spPr>
-        <p:txBody>
-          <a:bodyPr/>
-          <a:lstStyle/>
-          <a:p>
-            <a:r>
-              <a:rPr lang="en-PH" b="1" dirty="0">
-                <a:latin typeface="+mn-lt"/>
-              </a:rPr>
               <a:t>Policy Evaluation &amp; Iteration (Code)</a:t>
             </a:r>
           </a:p>
@@ -25933,7 +25398,7 @@
             </a:pPr>
             <a:r>
               <a:rPr lang="en-US" sz="2400" dirty="0"/>
-              <a:t>https://gym.openai.com/envs/FrozenLake-v0/</a:t>
+              <a:t>https://www.gymlibrary.dev/environments/toy_text/frozen_lake/</a:t>
             </a:r>
           </a:p>
         </p:txBody>
@@ -26045,7 +25510,7 @@
 </p:sld>
 </file>
 
-<file path=ppt/slides/slide35.xml><?xml version="1.0" encoding="utf-8"?>
+<file path=ppt/slides/slide34.xml><?xml version="1.0" encoding="utf-8"?>
 <p:sld xmlns:a="http://schemas.openxmlformats.org/drawingml/2006/main" xmlns:r="http://schemas.openxmlformats.org/officeDocument/2006/relationships" xmlns:p="http://schemas.openxmlformats.org/presentationml/2006/main">
   <p:cSld>
     <p:spTree>
@@ -32310,14 +31775,9 @@
 </file>
 
 <file path=customXml/item10.xml><?xml version="1.0" encoding="utf-8"?>
-<p:properties xmlns:p="http://schemas.microsoft.com/office/2006/metadata/properties" xmlns:xsi="http://www.w3.org/2001/XMLSchema-instance" xmlns:pc="http://schemas.microsoft.com/office/infopath/2007/PartnerControls">
-  <documentManagement>
-    <TaxCatchAll xmlns="8635a931-6b84-420a-938b-bf6e93596a85" xsi:nil="true"/>
-    <lcf76f155ced4ddcb4097134ff3c332f xmlns="83665817-2bf1-470e-9d34-a1cdf51135fc">
-      <Terms xmlns="http://schemas.microsoft.com/office/infopath/2007/PartnerControls"/>
-    </lcf76f155ced4ddcb4097134ff3c332f>
-  </documentManagement>
-</p:properties>
+<Control xmlns="http://schemas.microsoft.com/VisualStudio/2011/storyboarding/control">
+  <Id Name="8ace2fdb-12ac-4077-a484-31b1b60ebf69" Revision="1" Stencil="System.MyShapes" StencilVersion="1.0"/>
+</Control>
 </file>
 
 <file path=customXml/item11.xml><?xml version="1.0" encoding="utf-8"?>
@@ -32333,9 +31793,14 @@
 </file>
 
 <file path=customXml/item3.xml><?xml version="1.0" encoding="utf-8"?>
-<Control xmlns="http://schemas.microsoft.com/VisualStudio/2011/storyboarding/control">
-  <Id Name="8ace2fdb-12ac-4077-a484-31b1b60ebf69" Revision="1" Stencil="System.MyShapes" StencilVersion="1.0"/>
-</Control>
+<p:properties xmlns:p="http://schemas.microsoft.com/office/2006/metadata/properties" xmlns:xsi="http://www.w3.org/2001/XMLSchema-instance" xmlns:pc="http://schemas.microsoft.com/office/infopath/2007/PartnerControls">
+  <documentManagement>
+    <TaxCatchAll xmlns="8635a931-6b84-420a-938b-bf6e93596a85" xsi:nil="true"/>
+    <lcf76f155ced4ddcb4097134ff3c332f xmlns="83665817-2bf1-470e-9d34-a1cdf51135fc">
+      <Terms xmlns="http://schemas.microsoft.com/office/infopath/2007/PartnerControls"/>
+    </lcf76f155ced4ddcb4097134ff3c332f>
+  </documentManagement>
+</p:properties>
 </file>
 
 <file path=customXml/item4.xml><?xml version="1.0" encoding="utf-8"?>
@@ -32582,12 +32047,9 @@
 </file>
 
 <file path=customXml/item6.xml><?xml version="1.0" encoding="utf-8"?>
-<?mso-contentType ?>
-<FormTemplates xmlns="http://schemas.microsoft.com/sharepoint/v3/contenttype/forms">
-  <Display>DocumentLibraryForm</Display>
-  <Edit>DocumentLibraryForm</Edit>
-  <New>DocumentLibraryForm</New>
-</FormTemplates>
+<Control xmlns="http://schemas.microsoft.com/VisualStudio/2011/storyboarding/control">
+  <Id Name="8ace2fdb-12ac-4077-a484-31b1b60ebf69" Revision="1" Stencil="System.MyShapes" StencilVersion="1.0"/>
+</Control>
 </file>
 
 <file path=customXml/item7.xml><?xml version="1.0" encoding="utf-8"?>
@@ -32603,13 +32065,16 @@
 </file>
 
 <file path=customXml/item9.xml><?xml version="1.0" encoding="utf-8"?>
-<Control xmlns="http://schemas.microsoft.com/VisualStudio/2011/storyboarding/control">
-  <Id Name="8ace2fdb-12ac-4077-a484-31b1b60ebf69" Revision="1" Stencil="System.MyShapes" StencilVersion="1.0"/>
-</Control>
+<?mso-contentType ?>
+<FormTemplates xmlns="http://schemas.microsoft.com/sharepoint/v3/contenttype/forms">
+  <Display>DocumentLibraryForm</Display>
+  <Edit>DocumentLibraryForm</Edit>
+  <New>DocumentLibraryForm</New>
+</FormTemplates>
 </file>
 
 <file path=customXml/itemProps1.xml><?xml version="1.0" encoding="utf-8"?>
-<ds:datastoreItem xmlns:ds="http://schemas.openxmlformats.org/officeDocument/2006/customXml" ds:itemID="{F79BED0A-E20E-4F16-91D3-BB18BCF17AE7}">
+<ds:datastoreItem xmlns:ds="http://schemas.openxmlformats.org/officeDocument/2006/customXml" ds:itemID="{CAEBBB30-5DD1-4E52-82DE-A02E4733D29A}">
   <ds:schemaRefs>
     <ds:schemaRef ds:uri="http://schemas.microsoft.com/VisualStudio/2011/storyboarding/control"/>
   </ds:schemaRefs>
@@ -32617,18 +32082,15 @@
 </file>
 
 <file path=customXml/itemProps10.xml><?xml version="1.0" encoding="utf-8"?>
-<ds:datastoreItem xmlns:ds="http://schemas.openxmlformats.org/officeDocument/2006/customXml" ds:itemID="{FC2BB1E6-0B86-4DFC-B131-473180F90DE7}">
+<ds:datastoreItem xmlns:ds="http://schemas.openxmlformats.org/officeDocument/2006/customXml" ds:itemID="{C4D067AF-DC92-4F11-82F5-13007749D8F7}">
   <ds:schemaRefs>
-    <ds:schemaRef ds:uri="http://schemas.microsoft.com/office/2006/metadata/properties"/>
-    <ds:schemaRef ds:uri="http://schemas.microsoft.com/office/infopath/2007/PartnerControls"/>
-    <ds:schemaRef ds:uri="8635a931-6b84-420a-938b-bf6e93596a85"/>
-    <ds:schemaRef ds:uri="83665817-2bf1-470e-9d34-a1cdf51135fc"/>
+    <ds:schemaRef ds:uri="http://schemas.microsoft.com/VisualStudio/2011/storyboarding/control"/>
   </ds:schemaRefs>
 </ds:datastoreItem>
 </file>
 
 <file path=customXml/itemProps11.xml><?xml version="1.0" encoding="utf-8"?>
-<ds:datastoreItem xmlns:ds="http://schemas.openxmlformats.org/officeDocument/2006/customXml" ds:itemID="{CAEBBB30-5DD1-4E52-82DE-A02E4733D29A}">
+<ds:datastoreItem xmlns:ds="http://schemas.openxmlformats.org/officeDocument/2006/customXml" ds:itemID="{DB215FA1-4FD3-42FD-A00D-2232EB3452BE}">
   <ds:schemaRefs>
     <ds:schemaRef ds:uri="http://schemas.microsoft.com/VisualStudio/2011/storyboarding/control"/>
   </ds:schemaRefs>
@@ -32636,7 +32098,7 @@
 </file>
 
 <file path=customXml/itemProps2.xml><?xml version="1.0" encoding="utf-8"?>
-<ds:datastoreItem xmlns:ds="http://schemas.openxmlformats.org/officeDocument/2006/customXml" ds:itemID="{DB215FA1-4FD3-42FD-A00D-2232EB3452BE}">
+<ds:datastoreItem xmlns:ds="http://schemas.openxmlformats.org/officeDocument/2006/customXml" ds:itemID="{C0AE690A-6DA2-4539-97E4-9CACEDAE07A0}">
   <ds:schemaRefs>
     <ds:schemaRef ds:uri="http://schemas.microsoft.com/VisualStudio/2011/storyboarding/control"/>
   </ds:schemaRefs>
@@ -32644,9 +32106,12 @@
 </file>
 
 <file path=customXml/itemProps3.xml><?xml version="1.0" encoding="utf-8"?>
-<ds:datastoreItem xmlns:ds="http://schemas.openxmlformats.org/officeDocument/2006/customXml" ds:itemID="{1E432C16-7313-413A-AE06-D8B8B05337A0}">
+<ds:datastoreItem xmlns:ds="http://schemas.openxmlformats.org/officeDocument/2006/customXml" ds:itemID="{FC2BB1E6-0B86-4DFC-B131-473180F90DE7}">
   <ds:schemaRefs>
-    <ds:schemaRef ds:uri="http://schemas.microsoft.com/VisualStudio/2011/storyboarding/control"/>
+    <ds:schemaRef ds:uri="http://schemas.microsoft.com/office/2006/metadata/properties"/>
+    <ds:schemaRef ds:uri="http://schemas.microsoft.com/office/infopath/2007/PartnerControls"/>
+    <ds:schemaRef ds:uri="8635a931-6b84-420a-938b-bf6e93596a85"/>
+    <ds:schemaRef ds:uri="83665817-2bf1-470e-9d34-a1cdf51135fc"/>
   </ds:schemaRefs>
 </ds:datastoreItem>
 </file>
@@ -32671,7 +32136,7 @@
 </file>
 
 <file path=customXml/itemProps5.xml><?xml version="1.0" encoding="utf-8"?>
-<ds:datastoreItem xmlns:ds="http://schemas.openxmlformats.org/officeDocument/2006/customXml" ds:itemID="{C0AE690A-6DA2-4539-97E4-9CACEDAE07A0}">
+<ds:datastoreItem xmlns:ds="http://schemas.openxmlformats.org/officeDocument/2006/customXml" ds:itemID="{AD4724DF-B3D7-4FCF-AA8F-856D3FC7F828}">
   <ds:schemaRefs>
     <ds:schemaRef ds:uri="http://schemas.microsoft.com/VisualStudio/2011/storyboarding/control"/>
   </ds:schemaRefs>
@@ -32679,15 +32144,15 @@
 </file>
 
 <file path=customXml/itemProps6.xml><?xml version="1.0" encoding="utf-8"?>
-<ds:datastoreItem xmlns:ds="http://schemas.openxmlformats.org/officeDocument/2006/customXml" ds:itemID="{46187325-4E44-4D8D-A0FF-B1690BE43E86}">
+<ds:datastoreItem xmlns:ds="http://schemas.openxmlformats.org/officeDocument/2006/customXml" ds:itemID="{11BDA43E-947F-4629-A7CA-0F1298F3BE36}">
   <ds:schemaRefs>
-    <ds:schemaRef ds:uri="http://schemas.microsoft.com/sharepoint/v3/contenttype/forms"/>
+    <ds:schemaRef ds:uri="http://schemas.microsoft.com/VisualStudio/2011/storyboarding/control"/>
   </ds:schemaRefs>
 </ds:datastoreItem>
 </file>
 
 <file path=customXml/itemProps7.xml><?xml version="1.0" encoding="utf-8"?>
-<ds:datastoreItem xmlns:ds="http://schemas.openxmlformats.org/officeDocument/2006/customXml" ds:itemID="{C4D067AF-DC92-4F11-82F5-13007749D8F7}">
+<ds:datastoreItem xmlns:ds="http://schemas.openxmlformats.org/officeDocument/2006/customXml" ds:itemID="{1E432C16-7313-413A-AE06-D8B8B05337A0}">
   <ds:schemaRefs>
     <ds:schemaRef ds:uri="http://schemas.microsoft.com/VisualStudio/2011/storyboarding/control"/>
   </ds:schemaRefs>
@@ -32695,7 +32160,7 @@
 </file>
 
 <file path=customXml/itemProps8.xml><?xml version="1.0" encoding="utf-8"?>
-<ds:datastoreItem xmlns:ds="http://schemas.openxmlformats.org/officeDocument/2006/customXml" ds:itemID="{11BDA43E-947F-4629-A7CA-0F1298F3BE36}">
+<ds:datastoreItem xmlns:ds="http://schemas.openxmlformats.org/officeDocument/2006/customXml" ds:itemID="{F79BED0A-E20E-4F16-91D3-BB18BCF17AE7}">
   <ds:schemaRefs>
     <ds:schemaRef ds:uri="http://schemas.microsoft.com/VisualStudio/2011/storyboarding/control"/>
   </ds:schemaRefs>
@@ -32703,9 +32168,9 @@
 </file>
 
 <file path=customXml/itemProps9.xml><?xml version="1.0" encoding="utf-8"?>
-<ds:datastoreItem xmlns:ds="http://schemas.openxmlformats.org/officeDocument/2006/customXml" ds:itemID="{AD4724DF-B3D7-4FCF-AA8F-856D3FC7F828}">
+<ds:datastoreItem xmlns:ds="http://schemas.openxmlformats.org/officeDocument/2006/customXml" ds:itemID="{46187325-4E44-4D8D-A0FF-B1690BE43E86}">
   <ds:schemaRefs>
-    <ds:schemaRef ds:uri="http://schemas.microsoft.com/VisualStudio/2011/storyboarding/control"/>
+    <ds:schemaRef ds:uri="http://schemas.microsoft.com/sharepoint/v3/contenttype/forms"/>
   </ds:schemaRefs>
 </ds:datastoreItem>
 </file>
</xml_diff>

<commit_message>
Added frozen lake slide
</commit_message>
<xml_diff>
--- a/week_7/Module 5 - Dynamic Programming, Policy Evaluation.pptx
+++ b/week_7/Module 5 - Dynamic Programming, Policy Evaluation.pptx
@@ -6,7 +6,7 @@
     <p:sldMasterId id="2147483660" r:id="rId13"/>
   </p:sldMasterIdLst>
   <p:notesMasterIdLst>
-    <p:notesMasterId r:id="rId48"/>
+    <p:notesMasterId r:id="rId49"/>
   </p:notesMasterIdLst>
   <p:sldIdLst>
     <p:sldId id="256" r:id="rId14"/>
@@ -42,7 +42,8 @@
     <p:sldId id="381" r:id="rId44"/>
     <p:sldId id="380" r:id="rId45"/>
     <p:sldId id="356" r:id="rId46"/>
-    <p:sldId id="305" r:id="rId47"/>
+    <p:sldId id="382" r:id="rId47"/>
+    <p:sldId id="305" r:id="rId48"/>
   </p:sldIdLst>
   <p:sldSz cx="12192000" cy="6858000"/>
   <p:notesSz cx="6858000" cy="9144000"/>
@@ -1330,18 +1331,18 @@
     </pc:docChg>
   </pc:docChgLst>
   <pc:docChgLst>
-    <pc:chgData name="Joseph Marvin R. Imperial" userId="c5118018-74d5-4421-be4d-7197191e5b08" providerId="ADAL" clId="{8B587F43-1B51-4416-B410-57F8B9E236B1}"/>
-    <pc:docChg chg="undo custSel addSld delSld modSld">
-      <pc:chgData name="Joseph Marvin R. Imperial" userId="c5118018-74d5-4421-be4d-7197191e5b08" providerId="ADAL" clId="{8B587F43-1B51-4416-B410-57F8B9E236B1}" dt="2021-03-24T12:30:06.351" v="559" actId="5793"/>
+    <pc:chgData name="Joseph Marvin R. Imperial" userId="c5118018-74d5-4421-be4d-7197191e5b08" providerId="ADAL" clId="{AB9EEC7B-5938-AB4A-BBF1-2D08914B856E}"/>
+    <pc:docChg chg="addSld delSld">
+      <pc:chgData name="Joseph Marvin R. Imperial" userId="c5118018-74d5-4421-be4d-7197191e5b08" providerId="ADAL" clId="{AB9EEC7B-5938-AB4A-BBF1-2D08914B856E}" dt="2021-04-20T00:57:02.237" v="3" actId="2696"/>
       <pc:docMkLst>
         <pc:docMk/>
       </pc:docMkLst>
     </pc:docChg>
   </pc:docChgLst>
   <pc:docChgLst>
-    <pc:chgData name="Joseph Marvin R. Imperial" userId="c5118018-74d5-4421-be4d-7197191e5b08" providerId="ADAL" clId="{AB9EEC7B-5938-AB4A-BBF1-2D08914B856E}"/>
-    <pc:docChg chg="addSld delSld">
-      <pc:chgData name="Joseph Marvin R. Imperial" userId="c5118018-74d5-4421-be4d-7197191e5b08" providerId="ADAL" clId="{AB9EEC7B-5938-AB4A-BBF1-2D08914B856E}" dt="2021-04-20T00:57:02.237" v="3" actId="2696"/>
+    <pc:chgData name="Joseph Marvin R. Imperial" userId="c5118018-74d5-4421-be4d-7197191e5b08" providerId="ADAL" clId="{8B587F43-1B51-4416-B410-57F8B9E236B1}"/>
+    <pc:docChg chg="undo custSel addSld delSld modSld">
+      <pc:chgData name="Joseph Marvin R. Imperial" userId="c5118018-74d5-4421-be4d-7197191e5b08" providerId="ADAL" clId="{8B587F43-1B51-4416-B410-57F8B9E236B1}" dt="2021-03-24T12:30:06.351" v="559" actId="5793"/>
       <pc:docMkLst>
         <pc:docMk/>
       </pc:docMkLst>
@@ -25511,6 +25512,1329 @@
 </file>
 
 <file path=ppt/slides/slide34.xml><?xml version="1.0" encoding="utf-8"?>
+<p:sld xmlns:a="http://schemas.openxmlformats.org/drawingml/2006/main" xmlns:r="http://schemas.openxmlformats.org/officeDocument/2006/relationships" xmlns:p="http://schemas.openxmlformats.org/presentationml/2006/main">
+  <p:cSld>
+    <p:spTree>
+      <p:nvGrpSpPr>
+        <p:cNvPr id="1" name=""/>
+        <p:cNvGrpSpPr/>
+        <p:nvPr/>
+      </p:nvGrpSpPr>
+      <p:grpSpPr>
+        <a:xfrm>
+          <a:off x="0" y="0"/>
+          <a:ext cx="0" cy="0"/>
+          <a:chOff x="0" y="0"/>
+          <a:chExt cx="0" cy="0"/>
+        </a:xfrm>
+      </p:grpSpPr>
+      <p:sp>
+        <p:nvSpPr>
+          <p:cNvPr id="6" name="TextBox 5">
+            <a:extLst>
+              <a:ext uri="{FF2B5EF4-FFF2-40B4-BE49-F238E27FC236}">
+                <a16:creationId xmlns:a16="http://schemas.microsoft.com/office/drawing/2014/main" id="{933CA7EB-D821-4578-A186-D330E9178EDE}"/>
+              </a:ext>
+            </a:extLst>
+          </p:cNvPr>
+          <p:cNvSpPr txBox="1"/>
+          <p:nvPr/>
+        </p:nvSpPr>
+        <p:spPr>
+          <a:xfrm>
+            <a:off x="87923" y="28551"/>
+            <a:ext cx="3622432" cy="338554"/>
+          </a:xfrm>
+          <a:prstGeom prst="rect">
+            <a:avLst/>
+          </a:prstGeom>
+          <a:noFill/>
+        </p:spPr>
+        <p:txBody>
+          <a:bodyPr wrap="square" rtlCol="0">
+            <a:spAutoFit/>
+          </a:bodyPr>
+          <a:lstStyle/>
+          <a:p>
+            <a:r>
+              <a:rPr lang="en-PH" sz="1600">
+                <a:solidFill>
+                  <a:schemeClr val="bg1"/>
+                </a:solidFill>
+                <a:latin typeface="Abadi" panose="020B0604020104020204" pitchFamily="34" charset="0"/>
+                <a:cs typeface="Aharoni" panose="020B0604020202020204" pitchFamily="2" charset="-79"/>
+              </a:rPr>
+              <a:t>INTRODUCTION TO COMPUTING</a:t>
+            </a:r>
+          </a:p>
+        </p:txBody>
+      </p:sp>
+      <p:sp>
+        <p:nvSpPr>
+          <p:cNvPr id="7" name="TextBox 6">
+            <a:extLst>
+              <a:ext uri="{FF2B5EF4-FFF2-40B4-BE49-F238E27FC236}">
+                <a16:creationId xmlns:a16="http://schemas.microsoft.com/office/drawing/2014/main" id="{9B128FD4-EE77-4086-837E-5EAF83B0DDD1}"/>
+              </a:ext>
+            </a:extLst>
+          </p:cNvPr>
+          <p:cNvSpPr txBox="1"/>
+          <p:nvPr/>
+        </p:nvSpPr>
+        <p:spPr>
+          <a:xfrm>
+            <a:off x="9182099" y="13190"/>
+            <a:ext cx="2948354" cy="338554"/>
+          </a:xfrm>
+          <a:prstGeom prst="rect">
+            <a:avLst/>
+          </a:prstGeom>
+          <a:noFill/>
+        </p:spPr>
+        <p:txBody>
+          <a:bodyPr wrap="square" rtlCol="0">
+            <a:spAutoFit/>
+          </a:bodyPr>
+          <a:lstStyle/>
+          <a:p>
+            <a:pPr algn="r"/>
+            <a:r>
+              <a:rPr lang="en-US" sz="1600" dirty="0">
+                <a:solidFill>
+                  <a:schemeClr val="bg1"/>
+                </a:solidFill>
+              </a:rPr>
+              <a:t>Course Code: CCINCOM/L</a:t>
+            </a:r>
+            <a:endParaRPr lang="en-PH" sz="1600" dirty="0">
+              <a:solidFill>
+                <a:schemeClr val="bg1"/>
+              </a:solidFill>
+              <a:latin typeface="Abadi" panose="020B0604020202020204" pitchFamily="34" charset="0"/>
+            </a:endParaRPr>
+          </a:p>
+        </p:txBody>
+      </p:sp>
+      <p:sp>
+        <p:nvSpPr>
+          <p:cNvPr id="8" name="TextBox 7">
+            <a:extLst>
+              <a:ext uri="{FF2B5EF4-FFF2-40B4-BE49-F238E27FC236}">
+                <a16:creationId xmlns:a16="http://schemas.microsoft.com/office/drawing/2014/main" id="{B95C7AD6-4918-4294-AA88-B72FB28833FE}"/>
+              </a:ext>
+            </a:extLst>
+          </p:cNvPr>
+          <p:cNvSpPr txBox="1"/>
+          <p:nvPr/>
+        </p:nvSpPr>
+        <p:spPr>
+          <a:xfrm>
+            <a:off x="0" y="6479929"/>
+            <a:ext cx="2461846" cy="338554"/>
+          </a:xfrm>
+          <a:prstGeom prst="rect">
+            <a:avLst/>
+          </a:prstGeom>
+          <a:noFill/>
+        </p:spPr>
+        <p:txBody>
+          <a:bodyPr wrap="square" rtlCol="0">
+            <a:spAutoFit/>
+          </a:bodyPr>
+          <a:lstStyle/>
+          <a:p>
+            <a:pPr algn="ctr"/>
+            <a:r>
+              <a:rPr lang="en-PH" sz="1600">
+                <a:solidFill>
+                  <a:schemeClr val="bg1"/>
+                </a:solidFill>
+                <a:latin typeface="Abadi" panose="020B0604020202020204" pitchFamily="34" charset="0"/>
+              </a:rPr>
+              <a:t>Joseph Marvin R. Imperial</a:t>
+            </a:r>
+          </a:p>
+        </p:txBody>
+      </p:sp>
+      <p:sp>
+        <p:nvSpPr>
+          <p:cNvPr id="9" name="TextBox 8">
+            <a:extLst>
+              <a:ext uri="{FF2B5EF4-FFF2-40B4-BE49-F238E27FC236}">
+                <a16:creationId xmlns:a16="http://schemas.microsoft.com/office/drawing/2014/main" id="{C3136E3D-4CFD-4EFC-98AB-367D0EF3C06B}"/>
+              </a:ext>
+            </a:extLst>
+          </p:cNvPr>
+          <p:cNvSpPr txBox="1"/>
+          <p:nvPr/>
+        </p:nvSpPr>
+        <p:spPr>
+          <a:xfrm>
+            <a:off x="7086601" y="6490896"/>
+            <a:ext cx="5105399" cy="338554"/>
+          </a:xfrm>
+          <a:prstGeom prst="rect">
+            <a:avLst/>
+          </a:prstGeom>
+          <a:noFill/>
+        </p:spPr>
+        <p:txBody>
+          <a:bodyPr wrap="square" rtlCol="0">
+            <a:spAutoFit/>
+          </a:bodyPr>
+          <a:lstStyle/>
+          <a:p>
+            <a:pPr algn="r"/>
+            <a:r>
+              <a:rPr lang="en-PH" sz="1600">
+                <a:solidFill>
+                  <a:schemeClr val="bg1"/>
+                </a:solidFill>
+                <a:latin typeface="Abadi" panose="020B0604020202020204" pitchFamily="34" charset="0"/>
+              </a:rPr>
+              <a:t>NU College of Computing and Information Technologies</a:t>
+            </a:r>
+          </a:p>
+        </p:txBody>
+      </p:sp>
+      <p:sp>
+        <p:nvSpPr>
+          <p:cNvPr id="13" name="Rectangle 12">
+            <a:extLst>
+              <a:ext uri="{FF2B5EF4-FFF2-40B4-BE49-F238E27FC236}">
+                <a16:creationId xmlns:a16="http://schemas.microsoft.com/office/drawing/2014/main" id="{251B30DC-ACC5-404F-B51D-13612F115E3E}"/>
+              </a:ext>
+            </a:extLst>
+          </p:cNvPr>
+          <p:cNvSpPr/>
+          <p:nvPr/>
+        </p:nvSpPr>
+        <p:spPr>
+          <a:xfrm>
+            <a:off x="0" y="6462346"/>
+            <a:ext cx="12192000" cy="395654"/>
+          </a:xfrm>
+          <a:prstGeom prst="rect">
+            <a:avLst/>
+          </a:prstGeom>
+          <a:solidFill>
+            <a:schemeClr val="accent5">
+              <a:lumMod val="50000"/>
+            </a:schemeClr>
+          </a:solidFill>
+          <a:effectLst>
+            <a:outerShdw blurRad="50800" dist="38100" dir="2700000" algn="tl" rotWithShape="0">
+              <a:prstClr val="black">
+                <a:alpha val="40000"/>
+              </a:prstClr>
+            </a:outerShdw>
+          </a:effectLst>
+        </p:spPr>
+        <p:style>
+          <a:lnRef idx="2">
+            <a:schemeClr val="accent1">
+              <a:shade val="50000"/>
+            </a:schemeClr>
+          </a:lnRef>
+          <a:fillRef idx="1">
+            <a:schemeClr val="accent1"/>
+          </a:fillRef>
+          <a:effectRef idx="0">
+            <a:schemeClr val="accent1"/>
+          </a:effectRef>
+          <a:fontRef idx="minor">
+            <a:schemeClr val="lt1"/>
+          </a:fontRef>
+        </p:style>
+        <p:txBody>
+          <a:bodyPr rtlCol="0" anchor="ctr"/>
+          <a:lstStyle/>
+          <a:p>
+            <a:pPr algn="ctr"/>
+            <a:endParaRPr lang="en-PH"/>
+          </a:p>
+        </p:txBody>
+      </p:sp>
+      <p:sp>
+        <p:nvSpPr>
+          <p:cNvPr id="14" name="TextBox 13">
+            <a:extLst>
+              <a:ext uri="{FF2B5EF4-FFF2-40B4-BE49-F238E27FC236}">
+                <a16:creationId xmlns:a16="http://schemas.microsoft.com/office/drawing/2014/main" id="{ACC57CA2-30CA-4DDD-A941-8B9CC393DAFA}"/>
+              </a:ext>
+            </a:extLst>
+          </p:cNvPr>
+          <p:cNvSpPr txBox="1"/>
+          <p:nvPr/>
+        </p:nvSpPr>
+        <p:spPr>
+          <a:xfrm>
+            <a:off x="0" y="6490896"/>
+            <a:ext cx="3622432" cy="338554"/>
+          </a:xfrm>
+          <a:prstGeom prst="rect">
+            <a:avLst/>
+          </a:prstGeom>
+          <a:noFill/>
+        </p:spPr>
+        <p:txBody>
+          <a:bodyPr wrap="square" rtlCol="0">
+            <a:spAutoFit/>
+          </a:bodyPr>
+          <a:lstStyle/>
+          <a:p>
+            <a:r>
+              <a:rPr lang="en-PH" sz="1600">
+                <a:solidFill>
+                  <a:schemeClr val="bg1"/>
+                </a:solidFill>
+                <a:latin typeface="Abadi" panose="020B0604020104020204" pitchFamily="34" charset="0"/>
+                <a:cs typeface="Aharoni" panose="020B0604020202020204" pitchFamily="2" charset="-79"/>
+              </a:rPr>
+              <a:t>REINFORCEMENT LEARNING</a:t>
+            </a:r>
+          </a:p>
+        </p:txBody>
+      </p:sp>
+      <p:sp>
+        <p:nvSpPr>
+          <p:cNvPr id="15" name="TextBox 14">
+            <a:extLst>
+              <a:ext uri="{FF2B5EF4-FFF2-40B4-BE49-F238E27FC236}">
+                <a16:creationId xmlns:a16="http://schemas.microsoft.com/office/drawing/2014/main" id="{31237222-F604-49F1-8989-AF06AF20EDD3}"/>
+              </a:ext>
+            </a:extLst>
+          </p:cNvPr>
+          <p:cNvSpPr txBox="1"/>
+          <p:nvPr/>
+        </p:nvSpPr>
+        <p:spPr>
+          <a:xfrm>
+            <a:off x="9243646" y="6490896"/>
+            <a:ext cx="2948354" cy="338554"/>
+          </a:xfrm>
+          <a:prstGeom prst="rect">
+            <a:avLst/>
+          </a:prstGeom>
+          <a:noFill/>
+        </p:spPr>
+        <p:txBody>
+          <a:bodyPr wrap="square" rtlCol="0">
+            <a:spAutoFit/>
+          </a:bodyPr>
+          <a:lstStyle/>
+          <a:p>
+            <a:pPr algn="r"/>
+            <a:r>
+              <a:rPr lang="en-US" sz="1600">
+                <a:solidFill>
+                  <a:schemeClr val="bg1"/>
+                </a:solidFill>
+                <a:latin typeface="Abadi" panose="020B0604020104020204" pitchFamily="34" charset="0"/>
+              </a:rPr>
+              <a:t>Course Code: CCRNFLRL</a:t>
+            </a:r>
+            <a:endParaRPr lang="en-PH" sz="1600">
+              <a:solidFill>
+                <a:schemeClr val="bg1"/>
+              </a:solidFill>
+              <a:latin typeface="Abadi" panose="020B0604020104020204" pitchFamily="34" charset="0"/>
+            </a:endParaRPr>
+          </a:p>
+        </p:txBody>
+      </p:sp>
+      <p:sp>
+        <p:nvSpPr>
+          <p:cNvPr id="5" name="Title 4">
+            <a:extLst>
+              <a:ext uri="{FF2B5EF4-FFF2-40B4-BE49-F238E27FC236}">
+                <a16:creationId xmlns:a16="http://schemas.microsoft.com/office/drawing/2014/main" id="{EC47D021-EEC4-42AC-B4C3-BC584CB5BC9D}"/>
+              </a:ext>
+            </a:extLst>
+          </p:cNvPr>
+          <p:cNvSpPr>
+            <a:spLocks noGrp="1"/>
+          </p:cNvSpPr>
+          <p:nvPr>
+            <p:ph type="title"/>
+          </p:nvPr>
+        </p:nvSpPr>
+        <p:spPr>
+          <a:xfrm>
+            <a:off x="352425" y="292273"/>
+            <a:ext cx="11458574" cy="869778"/>
+          </a:xfrm>
+        </p:spPr>
+        <p:txBody>
+          <a:bodyPr/>
+          <a:lstStyle/>
+          <a:p>
+            <a:r>
+              <a:rPr lang="en-PH" b="1" dirty="0">
+                <a:latin typeface="+mn-lt"/>
+              </a:rPr>
+              <a:t>Frozen Lake</a:t>
+            </a:r>
+          </a:p>
+        </p:txBody>
+      </p:sp>
+      <p:graphicFrame>
+        <p:nvGraphicFramePr>
+          <p:cNvPr id="4" name="Table 19">
+            <a:extLst>
+              <a:ext uri="{FF2B5EF4-FFF2-40B4-BE49-F238E27FC236}">
+                <a16:creationId xmlns:a16="http://schemas.microsoft.com/office/drawing/2014/main" id="{D07D7227-99A5-30F9-3E18-083373E70993}"/>
+              </a:ext>
+            </a:extLst>
+          </p:cNvPr>
+          <p:cNvGraphicFramePr>
+            <a:graphicFrameLocks noGrp="1"/>
+          </p:cNvGraphicFramePr>
+          <p:nvPr>
+            <p:extLst>
+              <p:ext uri="{D42A27DB-BD31-4B8C-83A1-F6EECF244321}">
+                <p14:modId xmlns:p14="http://schemas.microsoft.com/office/powerpoint/2010/main" val="1005242106"/>
+              </p:ext>
+            </p:extLst>
+          </p:nvPr>
+        </p:nvGraphicFramePr>
+        <p:xfrm>
+          <a:off x="2931886" y="1344212"/>
+          <a:ext cx="6328228" cy="4323188"/>
+        </p:xfrm>
+        <a:graphic>
+          <a:graphicData uri="http://schemas.openxmlformats.org/drawingml/2006/table">
+            <a:tbl>
+              <a:tblPr firstRow="1" bandRow="1">
+                <a:tableStyleId>{5940675A-B579-460E-94D1-54222C63F5DA}</a:tableStyleId>
+              </a:tblPr>
+              <a:tblGrid>
+                <a:gridCol w="1582057">
+                  <a:extLst>
+                    <a:ext uri="{9D8B030D-6E8A-4147-A177-3AD203B41FA5}">
+                      <a16:colId xmlns:a16="http://schemas.microsoft.com/office/drawing/2014/main" val="1929385638"/>
+                    </a:ext>
+                  </a:extLst>
+                </a:gridCol>
+                <a:gridCol w="1582057">
+                  <a:extLst>
+                    <a:ext uri="{9D8B030D-6E8A-4147-A177-3AD203B41FA5}">
+                      <a16:colId xmlns:a16="http://schemas.microsoft.com/office/drawing/2014/main" val="4257203061"/>
+                    </a:ext>
+                  </a:extLst>
+                </a:gridCol>
+                <a:gridCol w="1582057">
+                  <a:extLst>
+                    <a:ext uri="{9D8B030D-6E8A-4147-A177-3AD203B41FA5}">
+                      <a16:colId xmlns:a16="http://schemas.microsoft.com/office/drawing/2014/main" val="921053444"/>
+                    </a:ext>
+                  </a:extLst>
+                </a:gridCol>
+                <a:gridCol w="1582057">
+                  <a:extLst>
+                    <a:ext uri="{9D8B030D-6E8A-4147-A177-3AD203B41FA5}">
+                      <a16:colId xmlns:a16="http://schemas.microsoft.com/office/drawing/2014/main" val="1440583798"/>
+                    </a:ext>
+                  </a:extLst>
+                </a:gridCol>
+              </a:tblGrid>
+              <a:tr h="1080797">
+                <a:tc>
+                  <a:txBody>
+                    <a:bodyPr/>
+                    <a:lstStyle/>
+                    <a:p>
+                      <a:r>
+                        <a:rPr lang="en-PH" b="1" dirty="0"/>
+                        <a:t>0</a:t>
+                      </a:r>
+                    </a:p>
+                    <a:p>
+                      <a:endParaRPr lang="en-PH" b="1" dirty="0"/>
+                    </a:p>
+                  </a:txBody>
+                  <a:tcPr>
+                    <a:solidFill>
+                      <a:srgbClr val="00B050"/>
+                    </a:solidFill>
+                  </a:tcPr>
+                </a:tc>
+                <a:tc>
+                  <a:txBody>
+                    <a:bodyPr/>
+                    <a:lstStyle/>
+                    <a:p>
+                      <a:r>
+                        <a:rPr lang="en-PH" b="1" dirty="0"/>
+                        <a:t>1</a:t>
+                      </a:r>
+                    </a:p>
+                  </a:txBody>
+                  <a:tcPr>
+                    <a:solidFill>
+                      <a:schemeClr val="bg1"/>
+                    </a:solidFill>
+                  </a:tcPr>
+                </a:tc>
+                <a:tc>
+                  <a:txBody>
+                    <a:bodyPr/>
+                    <a:lstStyle/>
+                    <a:p>
+                      <a:r>
+                        <a:rPr lang="en-PH" b="1" dirty="0"/>
+                        <a:t>2</a:t>
+                      </a:r>
+                    </a:p>
+                  </a:txBody>
+                  <a:tcPr>
+                    <a:solidFill>
+                      <a:schemeClr val="bg1"/>
+                    </a:solidFill>
+                  </a:tcPr>
+                </a:tc>
+                <a:tc>
+                  <a:txBody>
+                    <a:bodyPr/>
+                    <a:lstStyle/>
+                    <a:p>
+                      <a:r>
+                        <a:rPr lang="en-PH" b="1" dirty="0"/>
+                        <a:t>3</a:t>
+                      </a:r>
+                    </a:p>
+                  </a:txBody>
+                  <a:tcPr>
+                    <a:solidFill>
+                      <a:schemeClr val="bg1"/>
+                    </a:solidFill>
+                  </a:tcPr>
+                </a:tc>
+                <a:extLst>
+                  <a:ext uri="{0D108BD9-81ED-4DB2-BD59-A6C34878D82A}">
+                    <a16:rowId xmlns:a16="http://schemas.microsoft.com/office/drawing/2014/main" val="1919367945"/>
+                  </a:ext>
+                </a:extLst>
+              </a:tr>
+              <a:tr h="1080797">
+                <a:tc>
+                  <a:txBody>
+                    <a:bodyPr/>
+                    <a:lstStyle/>
+                    <a:p>
+                      <a:r>
+                        <a:rPr lang="en-PH" b="1" dirty="0"/>
+                        <a:t>4</a:t>
+                      </a:r>
+                    </a:p>
+                  </a:txBody>
+                  <a:tcPr>
+                    <a:solidFill>
+                      <a:schemeClr val="bg1"/>
+                    </a:solidFill>
+                  </a:tcPr>
+                </a:tc>
+                <a:tc>
+                  <a:txBody>
+                    <a:bodyPr/>
+                    <a:lstStyle/>
+                    <a:p>
+                      <a:r>
+                        <a:rPr lang="en-PH" b="1" dirty="0"/>
+                        <a:t>5</a:t>
+                      </a:r>
+                    </a:p>
+                  </a:txBody>
+                  <a:tcPr>
+                    <a:solidFill>
+                      <a:srgbClr val="FF0000"/>
+                    </a:solidFill>
+                  </a:tcPr>
+                </a:tc>
+                <a:tc>
+                  <a:txBody>
+                    <a:bodyPr/>
+                    <a:lstStyle/>
+                    <a:p>
+                      <a:r>
+                        <a:rPr lang="en-PH" b="1" dirty="0"/>
+                        <a:t>6</a:t>
+                      </a:r>
+                    </a:p>
+                  </a:txBody>
+                  <a:tcPr>
+                    <a:solidFill>
+                      <a:schemeClr val="bg1"/>
+                    </a:solidFill>
+                  </a:tcPr>
+                </a:tc>
+                <a:tc>
+                  <a:txBody>
+                    <a:bodyPr/>
+                    <a:lstStyle/>
+                    <a:p>
+                      <a:r>
+                        <a:rPr lang="en-PH" b="1" dirty="0"/>
+                        <a:t>7</a:t>
+                      </a:r>
+                    </a:p>
+                  </a:txBody>
+                  <a:tcPr>
+                    <a:solidFill>
+                      <a:srgbClr val="FF0000"/>
+                    </a:solidFill>
+                  </a:tcPr>
+                </a:tc>
+                <a:extLst>
+                  <a:ext uri="{0D108BD9-81ED-4DB2-BD59-A6C34878D82A}">
+                    <a16:rowId xmlns:a16="http://schemas.microsoft.com/office/drawing/2014/main" val="3546308454"/>
+                  </a:ext>
+                </a:extLst>
+              </a:tr>
+              <a:tr h="1080797">
+                <a:tc>
+                  <a:txBody>
+                    <a:bodyPr/>
+                    <a:lstStyle/>
+                    <a:p>
+                      <a:r>
+                        <a:rPr lang="en-PH" b="1" dirty="0"/>
+                        <a:t>8</a:t>
+                      </a:r>
+                    </a:p>
+                  </a:txBody>
+                  <a:tcPr>
+                    <a:solidFill>
+                      <a:schemeClr val="bg1"/>
+                    </a:solidFill>
+                  </a:tcPr>
+                </a:tc>
+                <a:tc>
+                  <a:txBody>
+                    <a:bodyPr/>
+                    <a:lstStyle/>
+                    <a:p>
+                      <a:r>
+                        <a:rPr lang="en-PH" b="1" dirty="0"/>
+                        <a:t>9</a:t>
+                      </a:r>
+                    </a:p>
+                  </a:txBody>
+                  <a:tcPr>
+                    <a:solidFill>
+                      <a:schemeClr val="bg1"/>
+                    </a:solidFill>
+                  </a:tcPr>
+                </a:tc>
+                <a:tc>
+                  <a:txBody>
+                    <a:bodyPr/>
+                    <a:lstStyle/>
+                    <a:p>
+                      <a:r>
+                        <a:rPr lang="en-PH" b="1" dirty="0"/>
+                        <a:t>10</a:t>
+                      </a:r>
+                    </a:p>
+                  </a:txBody>
+                  <a:tcPr>
+                    <a:solidFill>
+                      <a:schemeClr val="bg1"/>
+                    </a:solidFill>
+                  </a:tcPr>
+                </a:tc>
+                <a:tc>
+                  <a:txBody>
+                    <a:bodyPr/>
+                    <a:lstStyle/>
+                    <a:p>
+                      <a:r>
+                        <a:rPr lang="en-PH" b="1" dirty="0"/>
+                        <a:t>11</a:t>
+                      </a:r>
+                    </a:p>
+                  </a:txBody>
+                  <a:tcPr>
+                    <a:solidFill>
+                      <a:srgbClr val="FF0000"/>
+                    </a:solidFill>
+                  </a:tcPr>
+                </a:tc>
+                <a:extLst>
+                  <a:ext uri="{0D108BD9-81ED-4DB2-BD59-A6C34878D82A}">
+                    <a16:rowId xmlns:a16="http://schemas.microsoft.com/office/drawing/2014/main" val="1541585606"/>
+                  </a:ext>
+                </a:extLst>
+              </a:tr>
+              <a:tr h="1080797">
+                <a:tc>
+                  <a:txBody>
+                    <a:bodyPr/>
+                    <a:lstStyle/>
+                    <a:p>
+                      <a:r>
+                        <a:rPr lang="en-PH" b="1" dirty="0"/>
+                        <a:t>12</a:t>
+                      </a:r>
+                    </a:p>
+                  </a:txBody>
+                  <a:tcPr>
+                    <a:solidFill>
+                      <a:srgbClr val="FF0000"/>
+                    </a:solidFill>
+                  </a:tcPr>
+                </a:tc>
+                <a:tc>
+                  <a:txBody>
+                    <a:bodyPr/>
+                    <a:lstStyle/>
+                    <a:p>
+                      <a:r>
+                        <a:rPr lang="en-PH" b="1" dirty="0"/>
+                        <a:t>13</a:t>
+                      </a:r>
+                    </a:p>
+                  </a:txBody>
+                  <a:tcPr>
+                    <a:solidFill>
+                      <a:schemeClr val="bg1"/>
+                    </a:solidFill>
+                  </a:tcPr>
+                </a:tc>
+                <a:tc>
+                  <a:txBody>
+                    <a:bodyPr/>
+                    <a:lstStyle/>
+                    <a:p>
+                      <a:r>
+                        <a:rPr lang="en-PH" b="1" dirty="0"/>
+                        <a:t>14</a:t>
+                      </a:r>
+                    </a:p>
+                  </a:txBody>
+                  <a:tcPr>
+                    <a:solidFill>
+                      <a:schemeClr val="bg1"/>
+                    </a:solidFill>
+                  </a:tcPr>
+                </a:tc>
+                <a:tc>
+                  <a:txBody>
+                    <a:bodyPr/>
+                    <a:lstStyle/>
+                    <a:p>
+                      <a:r>
+                        <a:rPr lang="en-PH" b="1" dirty="0"/>
+                        <a:t>15</a:t>
+                      </a:r>
+                    </a:p>
+                  </a:txBody>
+                  <a:tcPr>
+                    <a:solidFill>
+                      <a:srgbClr val="FFFF00"/>
+                    </a:solidFill>
+                  </a:tcPr>
+                </a:tc>
+                <a:extLst>
+                  <a:ext uri="{0D108BD9-81ED-4DB2-BD59-A6C34878D82A}">
+                    <a16:rowId xmlns:a16="http://schemas.microsoft.com/office/drawing/2014/main" val="414022639"/>
+                  </a:ext>
+                </a:extLst>
+              </a:tr>
+            </a:tbl>
+          </a:graphicData>
+        </a:graphic>
+      </p:graphicFrame>
+      <p:sp>
+        <p:nvSpPr>
+          <p:cNvPr id="11" name="TextBox 10">
+            <a:extLst>
+              <a:ext uri="{FF2B5EF4-FFF2-40B4-BE49-F238E27FC236}">
+                <a16:creationId xmlns:a16="http://schemas.microsoft.com/office/drawing/2014/main" id="{96FEEE54-5BD6-177D-52BF-2BC404A5C835}"/>
+              </a:ext>
+            </a:extLst>
+          </p:cNvPr>
+          <p:cNvSpPr txBox="1"/>
+          <p:nvPr/>
+        </p:nvSpPr>
+        <p:spPr>
+          <a:xfrm>
+            <a:off x="3431377" y="1660848"/>
+            <a:ext cx="557956" cy="553998"/>
+          </a:xfrm>
+          <a:prstGeom prst="rect">
+            <a:avLst/>
+          </a:prstGeom>
+          <a:noFill/>
+        </p:spPr>
+        <p:txBody>
+          <a:bodyPr wrap="square" rtlCol="0">
+            <a:spAutoFit/>
+          </a:bodyPr>
+          <a:lstStyle/>
+          <a:p>
+            <a:pPr algn="ctr"/>
+            <a:r>
+              <a:rPr lang="en-PH" sz="3000" b="1" dirty="0"/>
+              <a:t>S</a:t>
+            </a:r>
+          </a:p>
+        </p:txBody>
+      </p:sp>
+      <p:sp>
+        <p:nvSpPr>
+          <p:cNvPr id="12" name="TextBox 11">
+            <a:extLst>
+              <a:ext uri="{FF2B5EF4-FFF2-40B4-BE49-F238E27FC236}">
+                <a16:creationId xmlns:a16="http://schemas.microsoft.com/office/drawing/2014/main" id="{EC9E6549-61B8-CC7E-4109-388B161BEAFA}"/>
+              </a:ext>
+            </a:extLst>
+          </p:cNvPr>
+          <p:cNvSpPr txBox="1"/>
+          <p:nvPr/>
+        </p:nvSpPr>
+        <p:spPr>
+          <a:xfrm>
+            <a:off x="8193099" y="4844481"/>
+            <a:ext cx="557956" cy="553998"/>
+          </a:xfrm>
+          <a:prstGeom prst="rect">
+            <a:avLst/>
+          </a:prstGeom>
+          <a:noFill/>
+        </p:spPr>
+        <p:txBody>
+          <a:bodyPr wrap="square" rtlCol="0">
+            <a:spAutoFit/>
+          </a:bodyPr>
+          <a:lstStyle/>
+          <a:p>
+            <a:pPr algn="ctr"/>
+            <a:r>
+              <a:rPr lang="en-PH" sz="3000" b="1" dirty="0"/>
+              <a:t>G</a:t>
+            </a:r>
+          </a:p>
+        </p:txBody>
+      </p:sp>
+      <p:sp>
+        <p:nvSpPr>
+          <p:cNvPr id="16" name="TextBox 15">
+            <a:extLst>
+              <a:ext uri="{FF2B5EF4-FFF2-40B4-BE49-F238E27FC236}">
+                <a16:creationId xmlns:a16="http://schemas.microsoft.com/office/drawing/2014/main" id="{20F90CBD-A005-E1F6-3330-DD2DE657A5C0}"/>
+              </a:ext>
+            </a:extLst>
+          </p:cNvPr>
+          <p:cNvSpPr txBox="1"/>
+          <p:nvPr/>
+        </p:nvSpPr>
+        <p:spPr>
+          <a:xfrm>
+            <a:off x="4989590" y="1660848"/>
+            <a:ext cx="557956" cy="553998"/>
+          </a:xfrm>
+          <a:prstGeom prst="rect">
+            <a:avLst/>
+          </a:prstGeom>
+          <a:noFill/>
+        </p:spPr>
+        <p:txBody>
+          <a:bodyPr wrap="square" rtlCol="0">
+            <a:spAutoFit/>
+          </a:bodyPr>
+          <a:lstStyle/>
+          <a:p>
+            <a:pPr algn="ctr"/>
+            <a:r>
+              <a:rPr lang="en-PH" sz="3000" b="1" dirty="0"/>
+              <a:t>F</a:t>
+            </a:r>
+          </a:p>
+        </p:txBody>
+      </p:sp>
+      <p:sp>
+        <p:nvSpPr>
+          <p:cNvPr id="17" name="TextBox 16">
+            <a:extLst>
+              <a:ext uri="{FF2B5EF4-FFF2-40B4-BE49-F238E27FC236}">
+                <a16:creationId xmlns:a16="http://schemas.microsoft.com/office/drawing/2014/main" id="{6B4DBA9A-7164-E0ED-5CE2-374E74D7A61A}"/>
+              </a:ext>
+            </a:extLst>
+          </p:cNvPr>
+          <p:cNvSpPr txBox="1"/>
+          <p:nvPr/>
+        </p:nvSpPr>
+        <p:spPr>
+          <a:xfrm>
+            <a:off x="6644456" y="1660848"/>
+            <a:ext cx="557956" cy="553998"/>
+          </a:xfrm>
+          <a:prstGeom prst="rect">
+            <a:avLst/>
+          </a:prstGeom>
+          <a:noFill/>
+        </p:spPr>
+        <p:txBody>
+          <a:bodyPr wrap="square" rtlCol="0">
+            <a:spAutoFit/>
+          </a:bodyPr>
+          <a:lstStyle/>
+          <a:p>
+            <a:pPr algn="ctr"/>
+            <a:r>
+              <a:rPr lang="en-PH" sz="3000" b="1" dirty="0"/>
+              <a:t>F</a:t>
+            </a:r>
+          </a:p>
+        </p:txBody>
+      </p:sp>
+      <p:sp>
+        <p:nvSpPr>
+          <p:cNvPr id="18" name="TextBox 17">
+            <a:extLst>
+              <a:ext uri="{FF2B5EF4-FFF2-40B4-BE49-F238E27FC236}">
+                <a16:creationId xmlns:a16="http://schemas.microsoft.com/office/drawing/2014/main" id="{A1F211E4-4944-3AC7-4A2A-31F3F1733156}"/>
+              </a:ext>
+            </a:extLst>
+          </p:cNvPr>
+          <p:cNvSpPr txBox="1"/>
+          <p:nvPr/>
+        </p:nvSpPr>
+        <p:spPr>
+          <a:xfrm>
+            <a:off x="8238932" y="1660848"/>
+            <a:ext cx="557956" cy="553998"/>
+          </a:xfrm>
+          <a:prstGeom prst="rect">
+            <a:avLst/>
+          </a:prstGeom>
+          <a:noFill/>
+        </p:spPr>
+        <p:txBody>
+          <a:bodyPr wrap="square" rtlCol="0">
+            <a:spAutoFit/>
+          </a:bodyPr>
+          <a:lstStyle/>
+          <a:p>
+            <a:pPr algn="ctr"/>
+            <a:r>
+              <a:rPr lang="en-PH" sz="3000" b="1" dirty="0"/>
+              <a:t>F</a:t>
+            </a:r>
+          </a:p>
+        </p:txBody>
+      </p:sp>
+      <p:sp>
+        <p:nvSpPr>
+          <p:cNvPr id="19" name="TextBox 18">
+            <a:extLst>
+              <a:ext uri="{FF2B5EF4-FFF2-40B4-BE49-F238E27FC236}">
+                <a16:creationId xmlns:a16="http://schemas.microsoft.com/office/drawing/2014/main" id="{4BA0C0D1-80E5-43D9-698E-AA512351D015}"/>
+              </a:ext>
+            </a:extLst>
+          </p:cNvPr>
+          <p:cNvSpPr txBox="1"/>
+          <p:nvPr/>
+        </p:nvSpPr>
+        <p:spPr>
+          <a:xfrm>
+            <a:off x="3431377" y="2732793"/>
+            <a:ext cx="557956" cy="553998"/>
+          </a:xfrm>
+          <a:prstGeom prst="rect">
+            <a:avLst/>
+          </a:prstGeom>
+          <a:noFill/>
+        </p:spPr>
+        <p:txBody>
+          <a:bodyPr wrap="square" rtlCol="0">
+            <a:spAutoFit/>
+          </a:bodyPr>
+          <a:lstStyle/>
+          <a:p>
+            <a:pPr algn="ctr"/>
+            <a:r>
+              <a:rPr lang="en-PH" sz="3000" b="1" dirty="0"/>
+              <a:t>F</a:t>
+            </a:r>
+          </a:p>
+        </p:txBody>
+      </p:sp>
+      <p:sp>
+        <p:nvSpPr>
+          <p:cNvPr id="20" name="TextBox 19">
+            <a:extLst>
+              <a:ext uri="{FF2B5EF4-FFF2-40B4-BE49-F238E27FC236}">
+                <a16:creationId xmlns:a16="http://schemas.microsoft.com/office/drawing/2014/main" id="{AE9B40DA-DB84-04A2-9380-FC129AAF24F0}"/>
+              </a:ext>
+            </a:extLst>
+          </p:cNvPr>
+          <p:cNvSpPr txBox="1"/>
+          <p:nvPr/>
+        </p:nvSpPr>
+        <p:spPr>
+          <a:xfrm>
+            <a:off x="4989590" y="2732793"/>
+            <a:ext cx="557956" cy="553998"/>
+          </a:xfrm>
+          <a:prstGeom prst="rect">
+            <a:avLst/>
+          </a:prstGeom>
+          <a:noFill/>
+        </p:spPr>
+        <p:txBody>
+          <a:bodyPr wrap="square" rtlCol="0">
+            <a:spAutoFit/>
+          </a:bodyPr>
+          <a:lstStyle/>
+          <a:p>
+            <a:pPr algn="ctr"/>
+            <a:r>
+              <a:rPr lang="en-PH" sz="3000" b="1" dirty="0"/>
+              <a:t>H</a:t>
+            </a:r>
+          </a:p>
+        </p:txBody>
+      </p:sp>
+      <p:sp>
+        <p:nvSpPr>
+          <p:cNvPr id="21" name="TextBox 20">
+            <a:extLst>
+              <a:ext uri="{FF2B5EF4-FFF2-40B4-BE49-F238E27FC236}">
+                <a16:creationId xmlns:a16="http://schemas.microsoft.com/office/drawing/2014/main" id="{A1192F11-AF04-9DB0-31F4-AC0B6F5C7175}"/>
+              </a:ext>
+            </a:extLst>
+          </p:cNvPr>
+          <p:cNvSpPr txBox="1"/>
+          <p:nvPr/>
+        </p:nvSpPr>
+        <p:spPr>
+          <a:xfrm>
+            <a:off x="6643397" y="2732793"/>
+            <a:ext cx="557956" cy="553998"/>
+          </a:xfrm>
+          <a:prstGeom prst="rect">
+            <a:avLst/>
+          </a:prstGeom>
+          <a:noFill/>
+        </p:spPr>
+        <p:txBody>
+          <a:bodyPr wrap="square" rtlCol="0">
+            <a:spAutoFit/>
+          </a:bodyPr>
+          <a:lstStyle/>
+          <a:p>
+            <a:pPr algn="ctr"/>
+            <a:r>
+              <a:rPr lang="en-PH" sz="3000" b="1" dirty="0"/>
+              <a:t>F</a:t>
+            </a:r>
+          </a:p>
+        </p:txBody>
+      </p:sp>
+      <p:sp>
+        <p:nvSpPr>
+          <p:cNvPr id="22" name="TextBox 21">
+            <a:extLst>
+              <a:ext uri="{FF2B5EF4-FFF2-40B4-BE49-F238E27FC236}">
+                <a16:creationId xmlns:a16="http://schemas.microsoft.com/office/drawing/2014/main" id="{A8960900-A44A-419E-4C01-6C8908A3C9E2}"/>
+              </a:ext>
+            </a:extLst>
+          </p:cNvPr>
+          <p:cNvSpPr txBox="1"/>
+          <p:nvPr/>
+        </p:nvSpPr>
+        <p:spPr>
+          <a:xfrm>
+            <a:off x="8238932" y="2732793"/>
+            <a:ext cx="557956" cy="553998"/>
+          </a:xfrm>
+          <a:prstGeom prst="rect">
+            <a:avLst/>
+          </a:prstGeom>
+          <a:noFill/>
+        </p:spPr>
+        <p:txBody>
+          <a:bodyPr wrap="square" rtlCol="0">
+            <a:spAutoFit/>
+          </a:bodyPr>
+          <a:lstStyle/>
+          <a:p>
+            <a:pPr algn="ctr"/>
+            <a:r>
+              <a:rPr lang="en-PH" sz="3000" b="1" dirty="0"/>
+              <a:t>H</a:t>
+            </a:r>
+          </a:p>
+        </p:txBody>
+      </p:sp>
+      <p:sp>
+        <p:nvSpPr>
+          <p:cNvPr id="23" name="TextBox 22">
+            <a:extLst>
+              <a:ext uri="{FF2B5EF4-FFF2-40B4-BE49-F238E27FC236}">
+                <a16:creationId xmlns:a16="http://schemas.microsoft.com/office/drawing/2014/main" id="{0FD437B4-1B24-A638-88E2-F938E689607A}"/>
+              </a:ext>
+            </a:extLst>
+          </p:cNvPr>
+          <p:cNvSpPr txBox="1"/>
+          <p:nvPr/>
+        </p:nvSpPr>
+        <p:spPr>
+          <a:xfrm>
+            <a:off x="3431377" y="3804738"/>
+            <a:ext cx="557956" cy="553998"/>
+          </a:xfrm>
+          <a:prstGeom prst="rect">
+            <a:avLst/>
+          </a:prstGeom>
+          <a:noFill/>
+        </p:spPr>
+        <p:txBody>
+          <a:bodyPr wrap="square" rtlCol="0">
+            <a:spAutoFit/>
+          </a:bodyPr>
+          <a:lstStyle/>
+          <a:p>
+            <a:pPr algn="ctr"/>
+            <a:r>
+              <a:rPr lang="en-PH" sz="3000" b="1" dirty="0"/>
+              <a:t>F</a:t>
+            </a:r>
+          </a:p>
+        </p:txBody>
+      </p:sp>
+      <p:sp>
+        <p:nvSpPr>
+          <p:cNvPr id="24" name="TextBox 23">
+            <a:extLst>
+              <a:ext uri="{FF2B5EF4-FFF2-40B4-BE49-F238E27FC236}">
+                <a16:creationId xmlns:a16="http://schemas.microsoft.com/office/drawing/2014/main" id="{1AB6C0C4-3E6C-541C-124D-FA0220D869F5}"/>
+              </a:ext>
+            </a:extLst>
+          </p:cNvPr>
+          <p:cNvSpPr txBox="1"/>
+          <p:nvPr/>
+        </p:nvSpPr>
+        <p:spPr>
+          <a:xfrm>
+            <a:off x="4989590" y="3804738"/>
+            <a:ext cx="557956" cy="553998"/>
+          </a:xfrm>
+          <a:prstGeom prst="rect">
+            <a:avLst/>
+          </a:prstGeom>
+          <a:noFill/>
+        </p:spPr>
+        <p:txBody>
+          <a:bodyPr wrap="square" rtlCol="0">
+            <a:spAutoFit/>
+          </a:bodyPr>
+          <a:lstStyle/>
+          <a:p>
+            <a:pPr algn="ctr"/>
+            <a:r>
+              <a:rPr lang="en-PH" sz="3000" b="1" dirty="0"/>
+              <a:t>F</a:t>
+            </a:r>
+          </a:p>
+        </p:txBody>
+      </p:sp>
+      <p:sp>
+        <p:nvSpPr>
+          <p:cNvPr id="25" name="TextBox 24">
+            <a:extLst>
+              <a:ext uri="{FF2B5EF4-FFF2-40B4-BE49-F238E27FC236}">
+                <a16:creationId xmlns:a16="http://schemas.microsoft.com/office/drawing/2014/main" id="{45541DF1-A755-7A31-A380-C4157258AA0F}"/>
+              </a:ext>
+            </a:extLst>
+          </p:cNvPr>
+          <p:cNvSpPr txBox="1"/>
+          <p:nvPr/>
+        </p:nvSpPr>
+        <p:spPr>
+          <a:xfrm>
+            <a:off x="6643397" y="3804738"/>
+            <a:ext cx="557956" cy="553998"/>
+          </a:xfrm>
+          <a:prstGeom prst="rect">
+            <a:avLst/>
+          </a:prstGeom>
+          <a:noFill/>
+        </p:spPr>
+        <p:txBody>
+          <a:bodyPr wrap="square" rtlCol="0">
+            <a:spAutoFit/>
+          </a:bodyPr>
+          <a:lstStyle/>
+          <a:p>
+            <a:pPr algn="ctr"/>
+            <a:r>
+              <a:rPr lang="en-PH" sz="3000" b="1" dirty="0"/>
+              <a:t>F</a:t>
+            </a:r>
+          </a:p>
+        </p:txBody>
+      </p:sp>
+      <p:sp>
+        <p:nvSpPr>
+          <p:cNvPr id="26" name="TextBox 25">
+            <a:extLst>
+              <a:ext uri="{FF2B5EF4-FFF2-40B4-BE49-F238E27FC236}">
+                <a16:creationId xmlns:a16="http://schemas.microsoft.com/office/drawing/2014/main" id="{12CD47DD-FD04-BE0C-E7EF-EA4E21222B04}"/>
+              </a:ext>
+            </a:extLst>
+          </p:cNvPr>
+          <p:cNvSpPr txBox="1"/>
+          <p:nvPr/>
+        </p:nvSpPr>
+        <p:spPr>
+          <a:xfrm>
+            <a:off x="8238932" y="3804738"/>
+            <a:ext cx="557956" cy="553998"/>
+          </a:xfrm>
+          <a:prstGeom prst="rect">
+            <a:avLst/>
+          </a:prstGeom>
+          <a:noFill/>
+        </p:spPr>
+        <p:txBody>
+          <a:bodyPr wrap="square" rtlCol="0">
+            <a:spAutoFit/>
+          </a:bodyPr>
+          <a:lstStyle/>
+          <a:p>
+            <a:pPr algn="ctr"/>
+            <a:r>
+              <a:rPr lang="en-PH" sz="3000" b="1" dirty="0"/>
+              <a:t>H</a:t>
+            </a:r>
+          </a:p>
+        </p:txBody>
+      </p:sp>
+      <p:sp>
+        <p:nvSpPr>
+          <p:cNvPr id="27" name="TextBox 26">
+            <a:extLst>
+              <a:ext uri="{FF2B5EF4-FFF2-40B4-BE49-F238E27FC236}">
+                <a16:creationId xmlns:a16="http://schemas.microsoft.com/office/drawing/2014/main" id="{0C2C0954-3BEB-C674-11A2-2F8A58E8D589}"/>
+              </a:ext>
+            </a:extLst>
+          </p:cNvPr>
+          <p:cNvSpPr txBox="1"/>
+          <p:nvPr/>
+        </p:nvSpPr>
+        <p:spPr>
+          <a:xfrm>
+            <a:off x="3431377" y="4876683"/>
+            <a:ext cx="557956" cy="553998"/>
+          </a:xfrm>
+          <a:prstGeom prst="rect">
+            <a:avLst/>
+          </a:prstGeom>
+          <a:noFill/>
+        </p:spPr>
+        <p:txBody>
+          <a:bodyPr wrap="square" rtlCol="0">
+            <a:spAutoFit/>
+          </a:bodyPr>
+          <a:lstStyle/>
+          <a:p>
+            <a:pPr algn="ctr"/>
+            <a:r>
+              <a:rPr lang="en-PH" sz="3000" b="1" dirty="0"/>
+              <a:t>H</a:t>
+            </a:r>
+          </a:p>
+        </p:txBody>
+      </p:sp>
+      <p:sp>
+        <p:nvSpPr>
+          <p:cNvPr id="28" name="TextBox 27">
+            <a:extLst>
+              <a:ext uri="{FF2B5EF4-FFF2-40B4-BE49-F238E27FC236}">
+                <a16:creationId xmlns:a16="http://schemas.microsoft.com/office/drawing/2014/main" id="{F850240F-DE41-20FE-AEB7-A544403379D4}"/>
+              </a:ext>
+            </a:extLst>
+          </p:cNvPr>
+          <p:cNvSpPr txBox="1"/>
+          <p:nvPr/>
+        </p:nvSpPr>
+        <p:spPr>
+          <a:xfrm>
+            <a:off x="4994751" y="4844481"/>
+            <a:ext cx="557956" cy="553998"/>
+          </a:xfrm>
+          <a:prstGeom prst="rect">
+            <a:avLst/>
+          </a:prstGeom>
+          <a:noFill/>
+        </p:spPr>
+        <p:txBody>
+          <a:bodyPr wrap="square" rtlCol="0">
+            <a:spAutoFit/>
+          </a:bodyPr>
+          <a:lstStyle/>
+          <a:p>
+            <a:pPr algn="ctr"/>
+            <a:r>
+              <a:rPr lang="en-PH" sz="3000" b="1" dirty="0"/>
+              <a:t>F</a:t>
+            </a:r>
+          </a:p>
+        </p:txBody>
+      </p:sp>
+      <p:sp>
+        <p:nvSpPr>
+          <p:cNvPr id="29" name="TextBox 28">
+            <a:extLst>
+              <a:ext uri="{FF2B5EF4-FFF2-40B4-BE49-F238E27FC236}">
+                <a16:creationId xmlns:a16="http://schemas.microsoft.com/office/drawing/2014/main" id="{BA5A7783-B86A-1D7E-52C2-1AE75DF70D00}"/>
+              </a:ext>
+            </a:extLst>
+          </p:cNvPr>
+          <p:cNvSpPr txBox="1"/>
+          <p:nvPr/>
+        </p:nvSpPr>
+        <p:spPr>
+          <a:xfrm>
+            <a:off x="6611527" y="4876683"/>
+            <a:ext cx="557956" cy="553998"/>
+          </a:xfrm>
+          <a:prstGeom prst="rect">
+            <a:avLst/>
+          </a:prstGeom>
+          <a:noFill/>
+        </p:spPr>
+        <p:txBody>
+          <a:bodyPr wrap="square" rtlCol="0">
+            <a:spAutoFit/>
+          </a:bodyPr>
+          <a:lstStyle/>
+          <a:p>
+            <a:pPr algn="ctr"/>
+            <a:r>
+              <a:rPr lang="en-PH" sz="3000" b="1" dirty="0"/>
+              <a:t>F</a:t>
+            </a:r>
+          </a:p>
+        </p:txBody>
+      </p:sp>
+    </p:spTree>
+    <p:extLst>
+      <p:ext uri="{BB962C8B-B14F-4D97-AF65-F5344CB8AC3E}">
+        <p14:creationId xmlns:p14="http://schemas.microsoft.com/office/powerpoint/2010/main" val="2036116260"/>
+      </p:ext>
+    </p:extLst>
+  </p:cSld>
+  <p:clrMapOvr>
+    <a:masterClrMapping/>
+  </p:clrMapOvr>
+</p:sld>
+</file>
+
+<file path=ppt/slides/slide35.xml><?xml version="1.0" encoding="utf-8"?>
 <p:sld xmlns:a="http://schemas.openxmlformats.org/drawingml/2006/main" xmlns:r="http://schemas.openxmlformats.org/officeDocument/2006/relationships" xmlns:p="http://schemas.openxmlformats.org/presentationml/2006/main">
   <p:cSld>
     <p:spTree>
@@ -31793,17 +33117,6 @@
 </file>
 
 <file path=customXml/item3.xml><?xml version="1.0" encoding="utf-8"?>
-<p:properties xmlns:p="http://schemas.microsoft.com/office/2006/metadata/properties" xmlns:xsi="http://www.w3.org/2001/XMLSchema-instance" xmlns:pc="http://schemas.microsoft.com/office/infopath/2007/PartnerControls">
-  <documentManagement>
-    <TaxCatchAll xmlns="8635a931-6b84-420a-938b-bf6e93596a85" xsi:nil="true"/>
-    <lcf76f155ced4ddcb4097134ff3c332f xmlns="83665817-2bf1-470e-9d34-a1cdf51135fc">
-      <Terms xmlns="http://schemas.microsoft.com/office/infopath/2007/PartnerControls"/>
-    </lcf76f155ced4ddcb4097134ff3c332f>
-  </documentManagement>
-</p:properties>
-</file>
-
-<file path=customXml/item4.xml><?xml version="1.0" encoding="utf-8"?>
 <ct:contentTypeSchema xmlns:ct="http://schemas.microsoft.com/office/2006/metadata/contentType" xmlns:ma="http://schemas.microsoft.com/office/2006/metadata/properties/metaAttributes" ct:_="" ma:_="" ma:contentTypeName="Document" ma:contentTypeID="0x010100A8972596D83CB9448D5CC5920EF207E5" ma:contentTypeVersion="15" ma:contentTypeDescription="Create a new document." ma:contentTypeScope="" ma:versionID="e0bf2008eb45d6d5fc139be6c8039e46">
   <xsd:schema xmlns:xsd="http://www.w3.org/2001/XMLSchema" xmlns:xs="http://www.w3.org/2001/XMLSchema" xmlns:p="http://schemas.microsoft.com/office/2006/metadata/properties" xmlns:ns2="83665817-2bf1-470e-9d34-a1cdf51135fc" xmlns:ns3="8635a931-6b84-420a-938b-bf6e93596a85" targetNamespace="http://schemas.microsoft.com/office/2006/metadata/properties" ma:root="true" ma:fieldsID="b3f89756f7e2a2b7ac115775bf8004ea" ns2:_="" ns3:_="">
     <xsd:import namespace="83665817-2bf1-470e-9d34-a1cdf51135fc"/>
@@ -32040,6 +33353,15 @@
 </ct:contentTypeSchema>
 </file>
 
+<file path=customXml/item4.xml><?xml version="1.0" encoding="utf-8"?>
+<?mso-contentType ?>
+<FormTemplates xmlns="http://schemas.microsoft.com/sharepoint/v3/contenttype/forms">
+  <Display>DocumentLibraryForm</Display>
+  <Edit>DocumentLibraryForm</Edit>
+  <New>DocumentLibraryForm</New>
+</FormTemplates>
+</file>
+
 <file path=customXml/item5.xml><?xml version="1.0" encoding="utf-8"?>
 <Control xmlns="http://schemas.microsoft.com/VisualStudio/2011/storyboarding/control">
   <Id Name="8ace2fdb-12ac-4077-a484-31b1b60ebf69" Revision="1" Stencil="System.MyShapes" StencilVersion="1.0"/>
@@ -32047,9 +33369,14 @@
 </file>
 
 <file path=customXml/item6.xml><?xml version="1.0" encoding="utf-8"?>
-<Control xmlns="http://schemas.microsoft.com/VisualStudio/2011/storyboarding/control">
-  <Id Name="8ace2fdb-12ac-4077-a484-31b1b60ebf69" Revision="1" Stencil="System.MyShapes" StencilVersion="1.0"/>
-</Control>
+<p:properties xmlns:p="http://schemas.microsoft.com/office/2006/metadata/properties" xmlns:xsi="http://www.w3.org/2001/XMLSchema-instance" xmlns:pc="http://schemas.microsoft.com/office/infopath/2007/PartnerControls">
+  <documentManagement>
+    <TaxCatchAll xmlns="8635a931-6b84-420a-938b-bf6e93596a85" xsi:nil="true"/>
+    <lcf76f155ced4ddcb4097134ff3c332f xmlns="83665817-2bf1-470e-9d34-a1cdf51135fc">
+      <Terms xmlns="http://schemas.microsoft.com/office/infopath/2007/PartnerControls"/>
+    </lcf76f155ced4ddcb4097134ff3c332f>
+  </documentManagement>
+</p:properties>
 </file>
 
 <file path=customXml/item7.xml><?xml version="1.0" encoding="utf-8"?>
@@ -32065,16 +33392,13 @@
 </file>
 
 <file path=customXml/item9.xml><?xml version="1.0" encoding="utf-8"?>
-<?mso-contentType ?>
-<FormTemplates xmlns="http://schemas.microsoft.com/sharepoint/v3/contenttype/forms">
-  <Display>DocumentLibraryForm</Display>
-  <Edit>DocumentLibraryForm</Edit>
-  <New>DocumentLibraryForm</New>
-</FormTemplates>
+<Control xmlns="http://schemas.microsoft.com/VisualStudio/2011/storyboarding/control">
+  <Id Name="8ace2fdb-12ac-4077-a484-31b1b60ebf69" Revision="1" Stencil="System.MyShapes" StencilVersion="1.0"/>
+</Control>
 </file>
 
 <file path=customXml/itemProps1.xml><?xml version="1.0" encoding="utf-8"?>
-<ds:datastoreItem xmlns:ds="http://schemas.openxmlformats.org/officeDocument/2006/customXml" ds:itemID="{CAEBBB30-5DD1-4E52-82DE-A02E4733D29A}">
+<ds:datastoreItem xmlns:ds="http://schemas.openxmlformats.org/officeDocument/2006/customXml" ds:itemID="{AD4724DF-B3D7-4FCF-AA8F-856D3FC7F828}">
   <ds:schemaRefs>
     <ds:schemaRef ds:uri="http://schemas.microsoft.com/VisualStudio/2011/storyboarding/control"/>
   </ds:schemaRefs>
@@ -32082,7 +33406,7 @@
 </file>
 
 <file path=customXml/itemProps10.xml><?xml version="1.0" encoding="utf-8"?>
-<ds:datastoreItem xmlns:ds="http://schemas.openxmlformats.org/officeDocument/2006/customXml" ds:itemID="{C4D067AF-DC92-4F11-82F5-13007749D8F7}">
+<ds:datastoreItem xmlns:ds="http://schemas.openxmlformats.org/officeDocument/2006/customXml" ds:itemID="{C0AE690A-6DA2-4539-97E4-9CACEDAE07A0}">
   <ds:schemaRefs>
     <ds:schemaRef ds:uri="http://schemas.microsoft.com/VisualStudio/2011/storyboarding/control"/>
   </ds:schemaRefs>
@@ -32098,7 +33422,7 @@
 </file>
 
 <file path=customXml/itemProps2.xml><?xml version="1.0" encoding="utf-8"?>
-<ds:datastoreItem xmlns:ds="http://schemas.openxmlformats.org/officeDocument/2006/customXml" ds:itemID="{C0AE690A-6DA2-4539-97E4-9CACEDAE07A0}">
+<ds:datastoreItem xmlns:ds="http://schemas.openxmlformats.org/officeDocument/2006/customXml" ds:itemID="{C4D067AF-DC92-4F11-82F5-13007749D8F7}">
   <ds:schemaRefs>
     <ds:schemaRef ds:uri="http://schemas.microsoft.com/VisualStudio/2011/storyboarding/control"/>
   </ds:schemaRefs>
@@ -32106,17 +33430,6 @@
 </file>
 
 <file path=customXml/itemProps3.xml><?xml version="1.0" encoding="utf-8"?>
-<ds:datastoreItem xmlns:ds="http://schemas.openxmlformats.org/officeDocument/2006/customXml" ds:itemID="{FC2BB1E6-0B86-4DFC-B131-473180F90DE7}">
-  <ds:schemaRefs>
-    <ds:schemaRef ds:uri="http://schemas.microsoft.com/office/2006/metadata/properties"/>
-    <ds:schemaRef ds:uri="http://schemas.microsoft.com/office/infopath/2007/PartnerControls"/>
-    <ds:schemaRef ds:uri="8635a931-6b84-420a-938b-bf6e93596a85"/>
-    <ds:schemaRef ds:uri="83665817-2bf1-470e-9d34-a1cdf51135fc"/>
-  </ds:schemaRefs>
-</ds:datastoreItem>
-</file>
-
-<file path=customXml/itemProps4.xml><?xml version="1.0" encoding="utf-8"?>
 <ds:datastoreItem xmlns:ds="http://schemas.openxmlformats.org/officeDocument/2006/customXml" ds:itemID="{17ACE3FB-1C8B-46DD-9994-6A00134F9809}">
   <ds:schemaRefs>
     <ds:schemaRef ds:uri="http://schemas.microsoft.com/office/2006/metadata/contentType"/>
@@ -32135,8 +33448,16 @@
 </ds:datastoreItem>
 </file>
 
+<file path=customXml/itemProps4.xml><?xml version="1.0" encoding="utf-8"?>
+<ds:datastoreItem xmlns:ds="http://schemas.openxmlformats.org/officeDocument/2006/customXml" ds:itemID="{46187325-4E44-4D8D-A0FF-B1690BE43E86}">
+  <ds:schemaRefs>
+    <ds:schemaRef ds:uri="http://schemas.microsoft.com/sharepoint/v3/contenttype/forms"/>
+  </ds:schemaRefs>
+</ds:datastoreItem>
+</file>
+
 <file path=customXml/itemProps5.xml><?xml version="1.0" encoding="utf-8"?>
-<ds:datastoreItem xmlns:ds="http://schemas.openxmlformats.org/officeDocument/2006/customXml" ds:itemID="{AD4724DF-B3D7-4FCF-AA8F-856D3FC7F828}">
+<ds:datastoreItem xmlns:ds="http://schemas.openxmlformats.org/officeDocument/2006/customXml" ds:itemID="{F79BED0A-E20E-4F16-91D3-BB18BCF17AE7}">
   <ds:schemaRefs>
     <ds:schemaRef ds:uri="http://schemas.microsoft.com/VisualStudio/2011/storyboarding/control"/>
   </ds:schemaRefs>
@@ -32144,6 +33465,25 @@
 </file>
 
 <file path=customXml/itemProps6.xml><?xml version="1.0" encoding="utf-8"?>
+<ds:datastoreItem xmlns:ds="http://schemas.openxmlformats.org/officeDocument/2006/customXml" ds:itemID="{FC2BB1E6-0B86-4DFC-B131-473180F90DE7}">
+  <ds:schemaRefs>
+    <ds:schemaRef ds:uri="http://schemas.microsoft.com/office/2006/metadata/properties"/>
+    <ds:schemaRef ds:uri="http://schemas.microsoft.com/office/infopath/2007/PartnerControls"/>
+    <ds:schemaRef ds:uri="8635a931-6b84-420a-938b-bf6e93596a85"/>
+    <ds:schemaRef ds:uri="83665817-2bf1-470e-9d34-a1cdf51135fc"/>
+  </ds:schemaRefs>
+</ds:datastoreItem>
+</file>
+
+<file path=customXml/itemProps7.xml><?xml version="1.0" encoding="utf-8"?>
+<ds:datastoreItem xmlns:ds="http://schemas.openxmlformats.org/officeDocument/2006/customXml" ds:itemID="{CAEBBB30-5DD1-4E52-82DE-A02E4733D29A}">
+  <ds:schemaRefs>
+    <ds:schemaRef ds:uri="http://schemas.microsoft.com/VisualStudio/2011/storyboarding/control"/>
+  </ds:schemaRefs>
+</ds:datastoreItem>
+</file>
+
+<file path=customXml/itemProps8.xml><?xml version="1.0" encoding="utf-8"?>
 <ds:datastoreItem xmlns:ds="http://schemas.openxmlformats.org/officeDocument/2006/customXml" ds:itemID="{11BDA43E-947F-4629-A7CA-0F1298F3BE36}">
   <ds:schemaRefs>
     <ds:schemaRef ds:uri="http://schemas.microsoft.com/VisualStudio/2011/storyboarding/control"/>
@@ -32151,26 +33491,10 @@
 </ds:datastoreItem>
 </file>
 
-<file path=customXml/itemProps7.xml><?xml version="1.0" encoding="utf-8"?>
+<file path=customXml/itemProps9.xml><?xml version="1.0" encoding="utf-8"?>
 <ds:datastoreItem xmlns:ds="http://schemas.openxmlformats.org/officeDocument/2006/customXml" ds:itemID="{1E432C16-7313-413A-AE06-D8B8B05337A0}">
   <ds:schemaRefs>
     <ds:schemaRef ds:uri="http://schemas.microsoft.com/VisualStudio/2011/storyboarding/control"/>
   </ds:schemaRefs>
 </ds:datastoreItem>
-</file>
-
-<file path=customXml/itemProps8.xml><?xml version="1.0" encoding="utf-8"?>
-<ds:datastoreItem xmlns:ds="http://schemas.openxmlformats.org/officeDocument/2006/customXml" ds:itemID="{F79BED0A-E20E-4F16-91D3-BB18BCF17AE7}">
-  <ds:schemaRefs>
-    <ds:schemaRef ds:uri="http://schemas.microsoft.com/VisualStudio/2011/storyboarding/control"/>
-  </ds:schemaRefs>
-</ds:datastoreItem>
-</file>
-
-<file path=customXml/itemProps9.xml><?xml version="1.0" encoding="utf-8"?>
-<ds:datastoreItem xmlns:ds="http://schemas.openxmlformats.org/officeDocument/2006/customXml" ds:itemID="{46187325-4E44-4D8D-A0FF-B1690BE43E86}">
-  <ds:schemaRefs>
-    <ds:schemaRef ds:uri="http://schemas.microsoft.com/sharepoint/v3/contenttype/forms"/>
-  </ds:schemaRefs>
-</ds:datastoreItem>
 </file>
</xml_diff>